<commit_message>
GF#11445, GF#11446 - More updates to Terminology Module diagram and related text.
</commit_message>
<xml_diff>
--- a/images/source/terminology-module-relationships.pptx
+++ b/images/source/terminology-module-relationships.pptx
@@ -3,7 +3,7 @@
 <p:presentation xmlns:a="http://schemas.openxmlformats.org/drawingml/2006/main" xmlns:r="http://schemas.openxmlformats.org/officeDocument/2006/relationships" xmlns:p="http://schemas.openxmlformats.org/presentationml/2006/main" saveSubsetFonts="1">
   <p:sldMasterIdLst>
     <p:sldMasterId id="2147483669" r:id="rId1"/>
-    <p:sldMasterId id="2147483705" r:id="rId2"/>
+    <p:sldMasterId id="2147483729" r:id="rId2"/>
   </p:sldMasterIdLst>
   <p:notesMasterIdLst>
     <p:notesMasterId r:id="rId4"/>
@@ -14,14 +14,14 @@
   <p:sldIdLst>
     <p:sldId id="296" r:id="rId3"/>
   </p:sldIdLst>
-  <p:sldSz cx="8869363" cy="4114800"/>
+  <p:sldSz cx="13716000" cy="6858000"/>
   <p:notesSz cx="6858000" cy="9144000"/>
   <p:defaultTextStyle>
     <a:defPPr>
       <a:defRPr lang="en-US"/>
     </a:defPPr>
-    <a:lvl1pPr marL="0" algn="l" defTabSz="614455" rtl="0" eaLnBrk="1" latinLnBrk="0" hangingPunct="1">
-      <a:defRPr sz="1210" kern="1200">
+    <a:lvl1pPr marL="0" algn="l" defTabSz="951975" rtl="0" eaLnBrk="1" latinLnBrk="0" hangingPunct="1">
+      <a:defRPr sz="1875" kern="1200">
         <a:solidFill>
           <a:schemeClr val="tx1"/>
         </a:solidFill>
@@ -30,8 +30,8 @@
         <a:cs typeface="+mn-cs"/>
       </a:defRPr>
     </a:lvl1pPr>
-    <a:lvl2pPr marL="307227" algn="l" defTabSz="614455" rtl="0" eaLnBrk="1" latinLnBrk="0" hangingPunct="1">
-      <a:defRPr sz="1210" kern="1200">
+    <a:lvl2pPr marL="475987" algn="l" defTabSz="951975" rtl="0" eaLnBrk="1" latinLnBrk="0" hangingPunct="1">
+      <a:defRPr sz="1875" kern="1200">
         <a:solidFill>
           <a:schemeClr val="tx1"/>
         </a:solidFill>
@@ -40,8 +40,8 @@
         <a:cs typeface="+mn-cs"/>
       </a:defRPr>
     </a:lvl2pPr>
-    <a:lvl3pPr marL="614455" algn="l" defTabSz="614455" rtl="0" eaLnBrk="1" latinLnBrk="0" hangingPunct="1">
-      <a:defRPr sz="1210" kern="1200">
+    <a:lvl3pPr marL="951975" algn="l" defTabSz="951975" rtl="0" eaLnBrk="1" latinLnBrk="0" hangingPunct="1">
+      <a:defRPr sz="1875" kern="1200">
         <a:solidFill>
           <a:schemeClr val="tx1"/>
         </a:solidFill>
@@ -50,8 +50,8 @@
         <a:cs typeface="+mn-cs"/>
       </a:defRPr>
     </a:lvl3pPr>
-    <a:lvl4pPr marL="921682" algn="l" defTabSz="614455" rtl="0" eaLnBrk="1" latinLnBrk="0" hangingPunct="1">
-      <a:defRPr sz="1210" kern="1200">
+    <a:lvl4pPr marL="1427962" algn="l" defTabSz="951975" rtl="0" eaLnBrk="1" latinLnBrk="0" hangingPunct="1">
+      <a:defRPr sz="1875" kern="1200">
         <a:solidFill>
           <a:schemeClr val="tx1"/>
         </a:solidFill>
@@ -60,8 +60,8 @@
         <a:cs typeface="+mn-cs"/>
       </a:defRPr>
     </a:lvl4pPr>
-    <a:lvl5pPr marL="1228910" algn="l" defTabSz="614455" rtl="0" eaLnBrk="1" latinLnBrk="0" hangingPunct="1">
-      <a:defRPr sz="1210" kern="1200">
+    <a:lvl5pPr marL="1903950" algn="l" defTabSz="951975" rtl="0" eaLnBrk="1" latinLnBrk="0" hangingPunct="1">
+      <a:defRPr sz="1875" kern="1200">
         <a:solidFill>
           <a:schemeClr val="tx1"/>
         </a:solidFill>
@@ -70,8 +70,8 @@
         <a:cs typeface="+mn-cs"/>
       </a:defRPr>
     </a:lvl5pPr>
-    <a:lvl6pPr marL="1536137" algn="l" defTabSz="614455" rtl="0" eaLnBrk="1" latinLnBrk="0" hangingPunct="1">
-      <a:defRPr sz="1210" kern="1200">
+    <a:lvl6pPr marL="2379937" algn="l" defTabSz="951975" rtl="0" eaLnBrk="1" latinLnBrk="0" hangingPunct="1">
+      <a:defRPr sz="1875" kern="1200">
         <a:solidFill>
           <a:schemeClr val="tx1"/>
         </a:solidFill>
@@ -80,8 +80,8 @@
         <a:cs typeface="+mn-cs"/>
       </a:defRPr>
     </a:lvl6pPr>
-    <a:lvl7pPr marL="1843365" algn="l" defTabSz="614455" rtl="0" eaLnBrk="1" latinLnBrk="0" hangingPunct="1">
-      <a:defRPr sz="1210" kern="1200">
+    <a:lvl7pPr marL="2855925" algn="l" defTabSz="951975" rtl="0" eaLnBrk="1" latinLnBrk="0" hangingPunct="1">
+      <a:defRPr sz="1875" kern="1200">
         <a:solidFill>
           <a:schemeClr val="tx1"/>
         </a:solidFill>
@@ -90,8 +90,8 @@
         <a:cs typeface="+mn-cs"/>
       </a:defRPr>
     </a:lvl7pPr>
-    <a:lvl8pPr marL="2150592" algn="l" defTabSz="614455" rtl="0" eaLnBrk="1" latinLnBrk="0" hangingPunct="1">
-      <a:defRPr sz="1210" kern="1200">
+    <a:lvl8pPr marL="3331912" algn="l" defTabSz="951975" rtl="0" eaLnBrk="1" latinLnBrk="0" hangingPunct="1">
+      <a:defRPr sz="1875" kern="1200">
         <a:solidFill>
           <a:schemeClr val="tx1"/>
         </a:solidFill>
@@ -100,8 +100,8 @@
         <a:cs typeface="+mn-cs"/>
       </a:defRPr>
     </a:lvl8pPr>
-    <a:lvl9pPr marL="2457819" algn="l" defTabSz="614455" rtl="0" eaLnBrk="1" latinLnBrk="0" hangingPunct="1">
-      <a:defRPr sz="1210" kern="1200">
+    <a:lvl9pPr marL="3807899" algn="l" defTabSz="951975" rtl="0" eaLnBrk="1" latinLnBrk="0" hangingPunct="1">
+      <a:defRPr sz="1875" kern="1200">
         <a:solidFill>
           <a:schemeClr val="tx1"/>
         </a:solidFill>
@@ -114,12 +114,12 @@
   <p:extLst>
     <p:ext uri="{EFAFB233-063F-42B5-8137-9DF3F51BA10A}">
       <p15:sldGuideLst xmlns:p15="http://schemas.microsoft.com/office/powerpoint/2012/main">
-        <p15:guide id="1" orient="horz" pos="1296" userDrawn="1">
+        <p15:guide id="1" orient="horz" pos="2160" userDrawn="1">
           <p15:clr>
             <a:srgbClr val="A4A3A4"/>
           </p15:clr>
         </p15:guide>
-        <p15:guide id="2" pos="2794" userDrawn="1">
+        <p15:guide id="2" pos="4321" userDrawn="1">
           <p15:clr>
             <a:srgbClr val="A4A3A4"/>
           </p15:clr>
@@ -412,8 +412,8 @@
         </p:nvSpPr>
         <p:spPr>
           <a:xfrm>
-            <a:off x="-265113" y="685800"/>
-            <a:ext cx="7388226" cy="3429000"/>
+            <a:off x="0" y="685800"/>
+            <a:ext cx="6858000" cy="3429000"/>
           </a:xfrm>
           <a:prstGeom prst="rect">
             <a:avLst/>
@@ -569,8 +569,8 @@
   </p:cSld>
   <p:clrMap bg1="lt1" tx1="dk1" bg2="lt2" tx2="dk2" accent1="accent1" accent2="accent2" accent3="accent3" accent4="accent4" accent5="accent5" accent6="accent6" hlink="hlink" folHlink="folHlink"/>
   <p:notesStyle>
-    <a:lvl1pPr marL="0" algn="l" defTabSz="614455" rtl="0" eaLnBrk="1" latinLnBrk="0" hangingPunct="1">
-      <a:defRPr sz="806" kern="1200">
+    <a:lvl1pPr marL="0" algn="l" defTabSz="951975" rtl="0" eaLnBrk="1" latinLnBrk="0" hangingPunct="1">
+      <a:defRPr sz="1249" kern="1200">
         <a:solidFill>
           <a:schemeClr val="tx1"/>
         </a:solidFill>
@@ -579,8 +579,8 @@
         <a:cs typeface="+mn-cs"/>
       </a:defRPr>
     </a:lvl1pPr>
-    <a:lvl2pPr marL="307227" algn="l" defTabSz="614455" rtl="0" eaLnBrk="1" latinLnBrk="0" hangingPunct="1">
-      <a:defRPr sz="806" kern="1200">
+    <a:lvl2pPr marL="475987" algn="l" defTabSz="951975" rtl="0" eaLnBrk="1" latinLnBrk="0" hangingPunct="1">
+      <a:defRPr sz="1249" kern="1200">
         <a:solidFill>
           <a:schemeClr val="tx1"/>
         </a:solidFill>
@@ -589,8 +589,8 @@
         <a:cs typeface="+mn-cs"/>
       </a:defRPr>
     </a:lvl2pPr>
-    <a:lvl3pPr marL="614455" algn="l" defTabSz="614455" rtl="0" eaLnBrk="1" latinLnBrk="0" hangingPunct="1">
-      <a:defRPr sz="806" kern="1200">
+    <a:lvl3pPr marL="951975" algn="l" defTabSz="951975" rtl="0" eaLnBrk="1" latinLnBrk="0" hangingPunct="1">
+      <a:defRPr sz="1249" kern="1200">
         <a:solidFill>
           <a:schemeClr val="tx1"/>
         </a:solidFill>
@@ -599,8 +599,8 @@
         <a:cs typeface="+mn-cs"/>
       </a:defRPr>
     </a:lvl3pPr>
-    <a:lvl4pPr marL="921682" algn="l" defTabSz="614455" rtl="0" eaLnBrk="1" latinLnBrk="0" hangingPunct="1">
-      <a:defRPr sz="806" kern="1200">
+    <a:lvl4pPr marL="1427962" algn="l" defTabSz="951975" rtl="0" eaLnBrk="1" latinLnBrk="0" hangingPunct="1">
+      <a:defRPr sz="1249" kern="1200">
         <a:solidFill>
           <a:schemeClr val="tx1"/>
         </a:solidFill>
@@ -609,8 +609,8 @@
         <a:cs typeface="+mn-cs"/>
       </a:defRPr>
     </a:lvl4pPr>
-    <a:lvl5pPr marL="1228910" algn="l" defTabSz="614455" rtl="0" eaLnBrk="1" latinLnBrk="0" hangingPunct="1">
-      <a:defRPr sz="806" kern="1200">
+    <a:lvl5pPr marL="1903950" algn="l" defTabSz="951975" rtl="0" eaLnBrk="1" latinLnBrk="0" hangingPunct="1">
+      <a:defRPr sz="1249" kern="1200">
         <a:solidFill>
           <a:schemeClr val="tx1"/>
         </a:solidFill>
@@ -619,8 +619,8 @@
         <a:cs typeface="+mn-cs"/>
       </a:defRPr>
     </a:lvl5pPr>
-    <a:lvl6pPr marL="1536137" algn="l" defTabSz="614455" rtl="0" eaLnBrk="1" latinLnBrk="0" hangingPunct="1">
-      <a:defRPr sz="806" kern="1200">
+    <a:lvl6pPr marL="2379937" algn="l" defTabSz="951975" rtl="0" eaLnBrk="1" latinLnBrk="0" hangingPunct="1">
+      <a:defRPr sz="1249" kern="1200">
         <a:solidFill>
           <a:schemeClr val="tx1"/>
         </a:solidFill>
@@ -629,8 +629,8 @@
         <a:cs typeface="+mn-cs"/>
       </a:defRPr>
     </a:lvl6pPr>
-    <a:lvl7pPr marL="1843365" algn="l" defTabSz="614455" rtl="0" eaLnBrk="1" latinLnBrk="0" hangingPunct="1">
-      <a:defRPr sz="806" kern="1200">
+    <a:lvl7pPr marL="2855925" algn="l" defTabSz="951975" rtl="0" eaLnBrk="1" latinLnBrk="0" hangingPunct="1">
+      <a:defRPr sz="1249" kern="1200">
         <a:solidFill>
           <a:schemeClr val="tx1"/>
         </a:solidFill>
@@ -639,8 +639,8 @@
         <a:cs typeface="+mn-cs"/>
       </a:defRPr>
     </a:lvl7pPr>
-    <a:lvl8pPr marL="2150592" algn="l" defTabSz="614455" rtl="0" eaLnBrk="1" latinLnBrk="0" hangingPunct="1">
-      <a:defRPr sz="806" kern="1200">
+    <a:lvl8pPr marL="3331912" algn="l" defTabSz="951975" rtl="0" eaLnBrk="1" latinLnBrk="0" hangingPunct="1">
+      <a:defRPr sz="1249" kern="1200">
         <a:solidFill>
           <a:schemeClr val="tx1"/>
         </a:solidFill>
@@ -649,8 +649,8 @@
         <a:cs typeface="+mn-cs"/>
       </a:defRPr>
     </a:lvl8pPr>
-    <a:lvl9pPr marL="2457819" algn="l" defTabSz="614455" rtl="0" eaLnBrk="1" latinLnBrk="0" hangingPunct="1">
-      <a:defRPr sz="806" kern="1200">
+    <a:lvl9pPr marL="3807899" algn="l" defTabSz="951975" rtl="0" eaLnBrk="1" latinLnBrk="0" hangingPunct="1">
+      <a:defRPr sz="1249" kern="1200">
         <a:solidFill>
           <a:schemeClr val="tx1"/>
         </a:solidFill>
@@ -698,8 +698,8 @@
         </p:nvSpPr>
         <p:spPr>
           <a:xfrm>
-            <a:off x="1108671" y="673418"/>
-            <a:ext cx="6652022" cy="1432560"/>
+            <a:off x="1714501" y="1122364"/>
+            <a:ext cx="10287000" cy="2387600"/>
           </a:xfrm>
           <a:prstGeom prst="rect">
             <a:avLst/>
@@ -738,8 +738,8 @@
         </p:nvSpPr>
         <p:spPr>
           <a:xfrm>
-            <a:off x="1108671" y="2161225"/>
-            <a:ext cx="6652022" cy="993457"/>
+            <a:off x="1714501" y="3602045"/>
+            <a:ext cx="10287000" cy="1655762"/>
           </a:xfrm>
           <a:prstGeom prst="rect">
             <a:avLst/>
@@ -811,8 +811,8 @@
         </p:nvSpPr>
         <p:spPr>
           <a:xfrm>
-            <a:off x="609769" y="3813812"/>
-            <a:ext cx="1995607" cy="219075"/>
+            <a:off x="942979" y="6356359"/>
+            <a:ext cx="3086101" cy="365125"/>
           </a:xfrm>
           <a:prstGeom prst="rect">
             <a:avLst/>
@@ -824,7 +824,7 @@
           <a:p>
             <a:fld id="{D87F77A1-31FB-DD4B-A95B-1A3ED477B6E2}" type="datetimeFigureOut">
               <a:rPr lang="en-US" smtClean="0"/>
-              <a:t>12/13/18</a:t>
+              <a:t>12/13/2018</a:t>
             </a:fld>
             <a:endParaRPr lang="en-US"/>
           </a:p>
@@ -848,8 +848,8 @@
         </p:nvSpPr>
         <p:spPr>
           <a:xfrm>
-            <a:off x="2937978" y="3813812"/>
-            <a:ext cx="2993410" cy="219075"/>
+            <a:off x="4543427" y="6356359"/>
+            <a:ext cx="4629150" cy="365125"/>
           </a:xfrm>
           <a:prstGeom prst="rect">
             <a:avLst/>
@@ -881,8 +881,8 @@
         </p:nvSpPr>
         <p:spPr>
           <a:xfrm>
-            <a:off x="6263988" y="3813812"/>
-            <a:ext cx="1995607" cy="219075"/>
+            <a:off x="9686929" y="6356359"/>
+            <a:ext cx="3086101" cy="365125"/>
           </a:xfrm>
           <a:prstGeom prst="rect">
             <a:avLst/>
@@ -948,8 +948,8 @@
         </p:nvSpPr>
         <p:spPr>
           <a:xfrm>
-            <a:off x="609770" y="219076"/>
-            <a:ext cx="7649826" cy="795338"/>
+            <a:off x="942978" y="365127"/>
+            <a:ext cx="11830051" cy="1325563"/>
           </a:xfrm>
           <a:prstGeom prst="rect">
             <a:avLst/>
@@ -984,8 +984,8 @@
         </p:nvSpPr>
         <p:spPr>
           <a:xfrm>
-            <a:off x="609770" y="1095376"/>
-            <a:ext cx="7649826" cy="2610803"/>
+            <a:off x="942978" y="1825631"/>
+            <a:ext cx="11830051" cy="4351338"/>
           </a:xfrm>
           <a:prstGeom prst="rect">
             <a:avLst/>
@@ -1049,8 +1049,8 @@
         </p:nvSpPr>
         <p:spPr>
           <a:xfrm>
-            <a:off x="609769" y="3813812"/>
-            <a:ext cx="1995607" cy="219075"/>
+            <a:off x="942979" y="6356359"/>
+            <a:ext cx="3086101" cy="365125"/>
           </a:xfrm>
           <a:prstGeom prst="rect">
             <a:avLst/>
@@ -1062,7 +1062,7 @@
           <a:p>
             <a:fld id="{D87F77A1-31FB-DD4B-A95B-1A3ED477B6E2}" type="datetimeFigureOut">
               <a:rPr lang="en-US" smtClean="0"/>
-              <a:t>12/13/18</a:t>
+              <a:t>12/13/2018</a:t>
             </a:fld>
             <a:endParaRPr lang="en-US"/>
           </a:p>
@@ -1086,8 +1086,8 @@
         </p:nvSpPr>
         <p:spPr>
           <a:xfrm>
-            <a:off x="2937978" y="3813812"/>
-            <a:ext cx="2993410" cy="219075"/>
+            <a:off x="4543427" y="6356359"/>
+            <a:ext cx="4629150" cy="365125"/>
           </a:xfrm>
           <a:prstGeom prst="rect">
             <a:avLst/>
@@ -1119,8 +1119,8 @@
         </p:nvSpPr>
         <p:spPr>
           <a:xfrm>
-            <a:off x="6263988" y="3813812"/>
-            <a:ext cx="1995607" cy="219075"/>
+            <a:off x="9686929" y="6356359"/>
+            <a:ext cx="3086101" cy="365125"/>
           </a:xfrm>
           <a:prstGeom prst="rect">
             <a:avLst/>
@@ -1186,8 +1186,8 @@
         </p:nvSpPr>
         <p:spPr>
           <a:xfrm>
-            <a:off x="6347139" y="219077"/>
-            <a:ext cx="1912456" cy="3487103"/>
+            <a:off x="9815514" y="365133"/>
+            <a:ext cx="2957512" cy="5811838"/>
           </a:xfrm>
           <a:prstGeom prst="rect">
             <a:avLst/>
@@ -1222,8 +1222,8 @@
         </p:nvSpPr>
         <p:spPr>
           <a:xfrm>
-            <a:off x="609770" y="219077"/>
-            <a:ext cx="5626502" cy="3487103"/>
+            <a:off x="942978" y="365133"/>
+            <a:ext cx="8701087" cy="5811838"/>
           </a:xfrm>
           <a:prstGeom prst="rect">
             <a:avLst/>
@@ -1287,8 +1287,8 @@
         </p:nvSpPr>
         <p:spPr>
           <a:xfrm>
-            <a:off x="609769" y="3813812"/>
-            <a:ext cx="1995607" cy="219075"/>
+            <a:off x="942979" y="6356359"/>
+            <a:ext cx="3086101" cy="365125"/>
           </a:xfrm>
           <a:prstGeom prst="rect">
             <a:avLst/>
@@ -1300,7 +1300,7 @@
           <a:p>
             <a:fld id="{D87F77A1-31FB-DD4B-A95B-1A3ED477B6E2}" type="datetimeFigureOut">
               <a:rPr lang="en-US" smtClean="0"/>
-              <a:t>12/13/18</a:t>
+              <a:t>12/13/2018</a:t>
             </a:fld>
             <a:endParaRPr lang="en-US"/>
           </a:p>
@@ -1324,8 +1324,8 @@
         </p:nvSpPr>
         <p:spPr>
           <a:xfrm>
-            <a:off x="2937978" y="3813812"/>
-            <a:ext cx="2993410" cy="219075"/>
+            <a:off x="4543427" y="6356359"/>
+            <a:ext cx="4629150" cy="365125"/>
           </a:xfrm>
           <a:prstGeom prst="rect">
             <a:avLst/>
@@ -1357,8 +1357,8 @@
         </p:nvSpPr>
         <p:spPr>
           <a:xfrm>
-            <a:off x="6263988" y="3813812"/>
-            <a:ext cx="1995607" cy="219075"/>
+            <a:off x="9686929" y="6356359"/>
+            <a:ext cx="3086101" cy="365125"/>
           </a:xfrm>
           <a:prstGeom prst="rect">
             <a:avLst/>
@@ -1418,15 +1418,15 @@
         </p:nvSpPr>
         <p:spPr>
           <a:xfrm>
-            <a:off x="1108671" y="673418"/>
-            <a:ext cx="6652022" cy="1432560"/>
+            <a:off x="1714500" y="1122363"/>
+            <a:ext cx="10287000" cy="2387600"/>
           </a:xfrm>
         </p:spPr>
         <p:txBody>
           <a:bodyPr anchor="b"/>
           <a:lstStyle>
             <a:lvl1pPr algn="ctr">
-              <a:defRPr sz="3600"/>
+              <a:defRPr sz="6000"/>
             </a:lvl1pPr>
           </a:lstStyle>
           <a:p>
@@ -1450,8 +1450,8 @@
         </p:nvSpPr>
         <p:spPr>
           <a:xfrm>
-            <a:off x="1108671" y="2161223"/>
-            <a:ext cx="6652022" cy="993457"/>
+            <a:off x="1714500" y="3602038"/>
+            <a:ext cx="10287000" cy="1655762"/>
           </a:xfrm>
         </p:spPr>
         <p:txBody>
@@ -1459,39 +1459,39 @@
           <a:lstStyle>
             <a:lvl1pPr marL="0" indent="0" algn="ctr">
               <a:buNone/>
-              <a:defRPr sz="1440"/>
+              <a:defRPr sz="2400"/>
             </a:lvl1pPr>
-            <a:lvl2pPr marL="274320" indent="0" algn="ctr">
-              <a:buNone/>
-              <a:defRPr sz="1200"/>
+            <a:lvl2pPr marL="457200" indent="0" algn="ctr">
+              <a:buNone/>
+              <a:defRPr sz="2000"/>
             </a:lvl2pPr>
-            <a:lvl3pPr marL="548640" indent="0" algn="ctr">
-              <a:buNone/>
-              <a:defRPr sz="1080"/>
+            <a:lvl3pPr marL="914400" indent="0" algn="ctr">
+              <a:buNone/>
+              <a:defRPr sz="1800"/>
             </a:lvl3pPr>
-            <a:lvl4pPr marL="822960" indent="0" algn="ctr">
-              <a:buNone/>
-              <a:defRPr sz="960"/>
+            <a:lvl4pPr marL="1371600" indent="0" algn="ctr">
+              <a:buNone/>
+              <a:defRPr sz="1600"/>
             </a:lvl4pPr>
-            <a:lvl5pPr marL="1097280" indent="0" algn="ctr">
-              <a:buNone/>
-              <a:defRPr sz="960"/>
+            <a:lvl5pPr marL="1828800" indent="0" algn="ctr">
+              <a:buNone/>
+              <a:defRPr sz="1600"/>
             </a:lvl5pPr>
-            <a:lvl6pPr marL="1371600" indent="0" algn="ctr">
-              <a:buNone/>
-              <a:defRPr sz="960"/>
+            <a:lvl6pPr marL="2286000" indent="0" algn="ctr">
+              <a:buNone/>
+              <a:defRPr sz="1600"/>
             </a:lvl6pPr>
-            <a:lvl7pPr marL="1645920" indent="0" algn="ctr">
-              <a:buNone/>
-              <a:defRPr sz="960"/>
+            <a:lvl7pPr marL="2743200" indent="0" algn="ctr">
+              <a:buNone/>
+              <a:defRPr sz="1600"/>
             </a:lvl7pPr>
-            <a:lvl8pPr marL="1920240" indent="0" algn="ctr">
-              <a:buNone/>
-              <a:defRPr sz="960"/>
+            <a:lvl8pPr marL="3200400" indent="0" algn="ctr">
+              <a:buNone/>
+              <a:defRPr sz="1600"/>
             </a:lvl8pPr>
-            <a:lvl9pPr marL="2194560" indent="0" algn="ctr">
-              <a:buNone/>
-              <a:defRPr sz="960"/>
+            <a:lvl9pPr marL="3657600" indent="0" algn="ctr">
+              <a:buNone/>
+              <a:defRPr sz="1600"/>
             </a:lvl9pPr>
           </a:lstStyle>
           <a:p>
@@ -1520,7 +1520,7 @@
           <a:p>
             <a:fld id="{D87F77A1-31FB-DD4B-A95B-1A3ED477B6E2}" type="datetimeFigureOut">
               <a:rPr lang="en-US" smtClean="0"/>
-              <a:t>12/13/18</a:t>
+              <a:t>12/13/2018</a:t>
             </a:fld>
             <a:endParaRPr lang="en-US"/>
           </a:p>
@@ -1571,7 +1571,7 @@
     </p:spTree>
     <p:extLst>
       <p:ext uri="{BB962C8B-B14F-4D97-AF65-F5344CB8AC3E}">
-        <p14:creationId xmlns:p14="http://schemas.microsoft.com/office/powerpoint/2010/main" val="3632640557"/>
+        <p14:creationId xmlns:p14="http://schemas.microsoft.com/office/powerpoint/2010/main" val="2780961025"/>
       </p:ext>
     </p:extLst>
   </p:cSld>
@@ -1690,7 +1690,7 @@
           <a:p>
             <a:fld id="{D87F77A1-31FB-DD4B-A95B-1A3ED477B6E2}" type="datetimeFigureOut">
               <a:rPr lang="en-US" smtClean="0"/>
-              <a:t>12/13/18</a:t>
+              <a:t>12/13/2018</a:t>
             </a:fld>
             <a:endParaRPr lang="en-US"/>
           </a:p>
@@ -1741,7 +1741,7 @@
     </p:spTree>
     <p:extLst>
       <p:ext uri="{BB962C8B-B14F-4D97-AF65-F5344CB8AC3E}">
-        <p14:creationId xmlns:p14="http://schemas.microsoft.com/office/powerpoint/2010/main" val="1050934215"/>
+        <p14:creationId xmlns:p14="http://schemas.microsoft.com/office/powerpoint/2010/main" val="1979155983"/>
       </p:ext>
     </p:extLst>
   </p:cSld>
@@ -1780,15 +1780,15 @@
         </p:nvSpPr>
         <p:spPr>
           <a:xfrm>
-            <a:off x="605149" y="1025843"/>
-            <a:ext cx="7649826" cy="1711642"/>
+            <a:off x="935831" y="1709739"/>
+            <a:ext cx="11830050" cy="2852737"/>
           </a:xfrm>
         </p:spPr>
         <p:txBody>
           <a:bodyPr anchor="b"/>
           <a:lstStyle>
             <a:lvl1pPr>
-              <a:defRPr sz="3600"/>
+              <a:defRPr sz="6000"/>
             </a:lvl1pPr>
           </a:lstStyle>
           <a:p>
@@ -1812,8 +1812,8 @@
         </p:nvSpPr>
         <p:spPr>
           <a:xfrm>
-            <a:off x="605149" y="2753678"/>
-            <a:ext cx="7649826" cy="900112"/>
+            <a:off x="935831" y="4589464"/>
+            <a:ext cx="11830050" cy="1500187"/>
           </a:xfrm>
         </p:spPr>
         <p:txBody>
@@ -1821,7 +1821,7 @@
           <a:lstStyle>
             <a:lvl1pPr marL="0" indent="0">
               <a:buNone/>
-              <a:defRPr sz="1440">
+              <a:defRPr sz="2400">
                 <a:solidFill>
                   <a:schemeClr val="tx1">
                     <a:tint val="75000"/>
@@ -1829,9 +1829,9 @@
                 </a:solidFill>
               </a:defRPr>
             </a:lvl1pPr>
-            <a:lvl2pPr marL="274320" indent="0">
-              <a:buNone/>
-              <a:defRPr sz="1200">
+            <a:lvl2pPr marL="457200" indent="0">
+              <a:buNone/>
+              <a:defRPr sz="2000">
                 <a:solidFill>
                   <a:schemeClr val="tx1">
                     <a:tint val="75000"/>
@@ -1839,9 +1839,9 @@
                 </a:solidFill>
               </a:defRPr>
             </a:lvl2pPr>
-            <a:lvl3pPr marL="548640" indent="0">
-              <a:buNone/>
-              <a:defRPr sz="1080">
+            <a:lvl3pPr marL="914400" indent="0">
+              <a:buNone/>
+              <a:defRPr sz="1800">
                 <a:solidFill>
                   <a:schemeClr val="tx1">
                     <a:tint val="75000"/>
@@ -1849,9 +1849,9 @@
                 </a:solidFill>
               </a:defRPr>
             </a:lvl3pPr>
-            <a:lvl4pPr marL="822960" indent="0">
-              <a:buNone/>
-              <a:defRPr sz="960">
+            <a:lvl4pPr marL="1371600" indent="0">
+              <a:buNone/>
+              <a:defRPr sz="1600">
                 <a:solidFill>
                   <a:schemeClr val="tx1">
                     <a:tint val="75000"/>
@@ -1859,9 +1859,9 @@
                 </a:solidFill>
               </a:defRPr>
             </a:lvl4pPr>
-            <a:lvl5pPr marL="1097280" indent="0">
-              <a:buNone/>
-              <a:defRPr sz="960">
+            <a:lvl5pPr marL="1828800" indent="0">
+              <a:buNone/>
+              <a:defRPr sz="1600">
                 <a:solidFill>
                   <a:schemeClr val="tx1">
                     <a:tint val="75000"/>
@@ -1869,9 +1869,9 @@
                 </a:solidFill>
               </a:defRPr>
             </a:lvl5pPr>
-            <a:lvl6pPr marL="1371600" indent="0">
-              <a:buNone/>
-              <a:defRPr sz="960">
+            <a:lvl6pPr marL="2286000" indent="0">
+              <a:buNone/>
+              <a:defRPr sz="1600">
                 <a:solidFill>
                   <a:schemeClr val="tx1">
                     <a:tint val="75000"/>
@@ -1879,9 +1879,9 @@
                 </a:solidFill>
               </a:defRPr>
             </a:lvl6pPr>
-            <a:lvl7pPr marL="1645920" indent="0">
-              <a:buNone/>
-              <a:defRPr sz="960">
+            <a:lvl7pPr marL="2743200" indent="0">
+              <a:buNone/>
+              <a:defRPr sz="1600">
                 <a:solidFill>
                   <a:schemeClr val="tx1">
                     <a:tint val="75000"/>
@@ -1889,9 +1889,9 @@
                 </a:solidFill>
               </a:defRPr>
             </a:lvl7pPr>
-            <a:lvl8pPr marL="1920240" indent="0">
-              <a:buNone/>
-              <a:defRPr sz="960">
+            <a:lvl8pPr marL="3200400" indent="0">
+              <a:buNone/>
+              <a:defRPr sz="1600">
                 <a:solidFill>
                   <a:schemeClr val="tx1">
                     <a:tint val="75000"/>
@@ -1899,9 +1899,9 @@
                 </a:solidFill>
               </a:defRPr>
             </a:lvl8pPr>
-            <a:lvl9pPr marL="2194560" indent="0">
-              <a:buNone/>
-              <a:defRPr sz="960">
+            <a:lvl9pPr marL="3657600" indent="0">
+              <a:buNone/>
+              <a:defRPr sz="1600">
                 <a:solidFill>
                   <a:schemeClr val="tx1">
                     <a:tint val="75000"/>
@@ -1936,7 +1936,7 @@
           <a:p>
             <a:fld id="{D87F77A1-31FB-DD4B-A95B-1A3ED477B6E2}" type="datetimeFigureOut">
               <a:rPr lang="en-US" smtClean="0"/>
-              <a:t>12/13/18</a:t>
+              <a:t>12/13/2018</a:t>
             </a:fld>
             <a:endParaRPr lang="en-US"/>
           </a:p>
@@ -1987,7 +1987,7 @@
     </p:spTree>
     <p:extLst>
       <p:ext uri="{BB962C8B-B14F-4D97-AF65-F5344CB8AC3E}">
-        <p14:creationId xmlns:p14="http://schemas.microsoft.com/office/powerpoint/2010/main" val="1962182670"/>
+        <p14:creationId xmlns:p14="http://schemas.microsoft.com/office/powerpoint/2010/main" val="605701262"/>
       </p:ext>
     </p:extLst>
   </p:cSld>
@@ -2049,8 +2049,8 @@
         </p:nvSpPr>
         <p:spPr>
           <a:xfrm>
-            <a:off x="609769" y="1095375"/>
-            <a:ext cx="3769479" cy="2610803"/>
+            <a:off x="942975" y="1825625"/>
+            <a:ext cx="5829300" cy="4351338"/>
           </a:xfrm>
         </p:spPr>
         <p:txBody>
@@ -2106,8 +2106,8 @@
         </p:nvSpPr>
         <p:spPr>
           <a:xfrm>
-            <a:off x="4490115" y="1095375"/>
-            <a:ext cx="3769479" cy="2610803"/>
+            <a:off x="6943725" y="1825625"/>
+            <a:ext cx="5829300" cy="4351338"/>
           </a:xfrm>
         </p:spPr>
         <p:txBody>
@@ -2168,7 +2168,7 @@
           <a:p>
             <a:fld id="{D87F77A1-31FB-DD4B-A95B-1A3ED477B6E2}" type="datetimeFigureOut">
               <a:rPr lang="en-US" smtClean="0"/>
-              <a:t>12/13/18</a:t>
+              <a:t>12/13/2018</a:t>
             </a:fld>
             <a:endParaRPr lang="en-US"/>
           </a:p>
@@ -2219,7 +2219,7 @@
     </p:spTree>
     <p:extLst>
       <p:ext uri="{BB962C8B-B14F-4D97-AF65-F5344CB8AC3E}">
-        <p14:creationId xmlns:p14="http://schemas.microsoft.com/office/powerpoint/2010/main" val="3690826047"/>
+        <p14:creationId xmlns:p14="http://schemas.microsoft.com/office/powerpoint/2010/main" val="3480225887"/>
       </p:ext>
     </p:extLst>
   </p:cSld>
@@ -2258,8 +2258,8 @@
         </p:nvSpPr>
         <p:spPr>
           <a:xfrm>
-            <a:off x="610924" y="219075"/>
-            <a:ext cx="7649826" cy="795338"/>
+            <a:off x="944762" y="365126"/>
+            <a:ext cx="11830050" cy="1325563"/>
           </a:xfrm>
         </p:spPr>
         <p:txBody>
@@ -2286,8 +2286,8 @@
         </p:nvSpPr>
         <p:spPr>
           <a:xfrm>
-            <a:off x="610924" y="1008698"/>
-            <a:ext cx="3752156" cy="494347"/>
+            <a:off x="944762" y="1681163"/>
+            <a:ext cx="5802510" cy="823912"/>
           </a:xfrm>
         </p:spPr>
         <p:txBody>
@@ -2295,39 +2295,39 @@
           <a:lstStyle>
             <a:lvl1pPr marL="0" indent="0">
               <a:buNone/>
-              <a:defRPr sz="1440" b="1"/>
+              <a:defRPr sz="2400" b="1"/>
             </a:lvl1pPr>
-            <a:lvl2pPr marL="274320" indent="0">
-              <a:buNone/>
-              <a:defRPr sz="1200" b="1"/>
+            <a:lvl2pPr marL="457200" indent="0">
+              <a:buNone/>
+              <a:defRPr sz="2000" b="1"/>
             </a:lvl2pPr>
-            <a:lvl3pPr marL="548640" indent="0">
-              <a:buNone/>
-              <a:defRPr sz="1080" b="1"/>
+            <a:lvl3pPr marL="914400" indent="0">
+              <a:buNone/>
+              <a:defRPr sz="1800" b="1"/>
             </a:lvl3pPr>
-            <a:lvl4pPr marL="822960" indent="0">
-              <a:buNone/>
-              <a:defRPr sz="960" b="1"/>
+            <a:lvl4pPr marL="1371600" indent="0">
+              <a:buNone/>
+              <a:defRPr sz="1600" b="1"/>
             </a:lvl4pPr>
-            <a:lvl5pPr marL="1097280" indent="0">
-              <a:buNone/>
-              <a:defRPr sz="960" b="1"/>
+            <a:lvl5pPr marL="1828800" indent="0">
+              <a:buNone/>
+              <a:defRPr sz="1600" b="1"/>
             </a:lvl5pPr>
-            <a:lvl6pPr marL="1371600" indent="0">
-              <a:buNone/>
-              <a:defRPr sz="960" b="1"/>
+            <a:lvl6pPr marL="2286000" indent="0">
+              <a:buNone/>
+              <a:defRPr sz="1600" b="1"/>
             </a:lvl6pPr>
-            <a:lvl7pPr marL="1645920" indent="0">
-              <a:buNone/>
-              <a:defRPr sz="960" b="1"/>
+            <a:lvl7pPr marL="2743200" indent="0">
+              <a:buNone/>
+              <a:defRPr sz="1600" b="1"/>
             </a:lvl7pPr>
-            <a:lvl8pPr marL="1920240" indent="0">
-              <a:buNone/>
-              <a:defRPr sz="960" b="1"/>
+            <a:lvl8pPr marL="3200400" indent="0">
+              <a:buNone/>
+              <a:defRPr sz="1600" b="1"/>
             </a:lvl8pPr>
-            <a:lvl9pPr marL="2194560" indent="0">
-              <a:buNone/>
-              <a:defRPr sz="960" b="1"/>
+            <a:lvl9pPr marL="3657600" indent="0">
+              <a:buNone/>
+              <a:defRPr sz="1600" b="1"/>
             </a:lvl9pPr>
           </a:lstStyle>
           <a:p>
@@ -2351,8 +2351,8 @@
         </p:nvSpPr>
         <p:spPr>
           <a:xfrm>
-            <a:off x="610924" y="1503045"/>
-            <a:ext cx="3752156" cy="2210753"/>
+            <a:off x="944762" y="2505075"/>
+            <a:ext cx="5802510" cy="3684588"/>
           </a:xfrm>
         </p:spPr>
         <p:txBody>
@@ -2408,8 +2408,8 @@
         </p:nvSpPr>
         <p:spPr>
           <a:xfrm>
-            <a:off x="4490115" y="1008698"/>
-            <a:ext cx="3770635" cy="494347"/>
+            <a:off x="6943725" y="1681163"/>
+            <a:ext cx="5831087" cy="823912"/>
           </a:xfrm>
         </p:spPr>
         <p:txBody>
@@ -2417,39 +2417,39 @@
           <a:lstStyle>
             <a:lvl1pPr marL="0" indent="0">
               <a:buNone/>
-              <a:defRPr sz="1440" b="1"/>
+              <a:defRPr sz="2400" b="1"/>
             </a:lvl1pPr>
-            <a:lvl2pPr marL="274320" indent="0">
-              <a:buNone/>
-              <a:defRPr sz="1200" b="1"/>
+            <a:lvl2pPr marL="457200" indent="0">
+              <a:buNone/>
+              <a:defRPr sz="2000" b="1"/>
             </a:lvl2pPr>
-            <a:lvl3pPr marL="548640" indent="0">
-              <a:buNone/>
-              <a:defRPr sz="1080" b="1"/>
+            <a:lvl3pPr marL="914400" indent="0">
+              <a:buNone/>
+              <a:defRPr sz="1800" b="1"/>
             </a:lvl3pPr>
-            <a:lvl4pPr marL="822960" indent="0">
-              <a:buNone/>
-              <a:defRPr sz="960" b="1"/>
+            <a:lvl4pPr marL="1371600" indent="0">
+              <a:buNone/>
+              <a:defRPr sz="1600" b="1"/>
             </a:lvl4pPr>
-            <a:lvl5pPr marL="1097280" indent="0">
-              <a:buNone/>
-              <a:defRPr sz="960" b="1"/>
+            <a:lvl5pPr marL="1828800" indent="0">
+              <a:buNone/>
+              <a:defRPr sz="1600" b="1"/>
             </a:lvl5pPr>
-            <a:lvl6pPr marL="1371600" indent="0">
-              <a:buNone/>
-              <a:defRPr sz="960" b="1"/>
+            <a:lvl6pPr marL="2286000" indent="0">
+              <a:buNone/>
+              <a:defRPr sz="1600" b="1"/>
             </a:lvl6pPr>
-            <a:lvl7pPr marL="1645920" indent="0">
-              <a:buNone/>
-              <a:defRPr sz="960" b="1"/>
+            <a:lvl7pPr marL="2743200" indent="0">
+              <a:buNone/>
+              <a:defRPr sz="1600" b="1"/>
             </a:lvl7pPr>
-            <a:lvl8pPr marL="1920240" indent="0">
-              <a:buNone/>
-              <a:defRPr sz="960" b="1"/>
+            <a:lvl8pPr marL="3200400" indent="0">
+              <a:buNone/>
+              <a:defRPr sz="1600" b="1"/>
             </a:lvl8pPr>
-            <a:lvl9pPr marL="2194560" indent="0">
-              <a:buNone/>
-              <a:defRPr sz="960" b="1"/>
+            <a:lvl9pPr marL="3657600" indent="0">
+              <a:buNone/>
+              <a:defRPr sz="1600" b="1"/>
             </a:lvl9pPr>
           </a:lstStyle>
           <a:p>
@@ -2473,8 +2473,8 @@
         </p:nvSpPr>
         <p:spPr>
           <a:xfrm>
-            <a:off x="4490115" y="1503045"/>
-            <a:ext cx="3770635" cy="2210753"/>
+            <a:off x="6943725" y="2505075"/>
+            <a:ext cx="5831087" cy="3684588"/>
           </a:xfrm>
         </p:spPr>
         <p:txBody>
@@ -2535,7 +2535,7 @@
           <a:p>
             <a:fld id="{D87F77A1-31FB-DD4B-A95B-1A3ED477B6E2}" type="datetimeFigureOut">
               <a:rPr lang="en-US" smtClean="0"/>
-              <a:t>12/13/18</a:t>
+              <a:t>12/13/2018</a:t>
             </a:fld>
             <a:endParaRPr lang="en-US"/>
           </a:p>
@@ -2586,7 +2586,7 @@
     </p:spTree>
     <p:extLst>
       <p:ext uri="{BB962C8B-B14F-4D97-AF65-F5344CB8AC3E}">
-        <p14:creationId xmlns:p14="http://schemas.microsoft.com/office/powerpoint/2010/main" val="425825417"/>
+        <p14:creationId xmlns:p14="http://schemas.microsoft.com/office/powerpoint/2010/main" val="3500580489"/>
       </p:ext>
     </p:extLst>
   </p:cSld>
@@ -2653,7 +2653,7 @@
           <a:p>
             <a:fld id="{D87F77A1-31FB-DD4B-A95B-1A3ED477B6E2}" type="datetimeFigureOut">
               <a:rPr lang="en-US" smtClean="0"/>
-              <a:t>12/13/18</a:t>
+              <a:t>12/13/2018</a:t>
             </a:fld>
             <a:endParaRPr lang="en-US"/>
           </a:p>
@@ -2704,7 +2704,7 @@
     </p:spTree>
     <p:extLst>
       <p:ext uri="{BB962C8B-B14F-4D97-AF65-F5344CB8AC3E}">
-        <p14:creationId xmlns:p14="http://schemas.microsoft.com/office/powerpoint/2010/main" val="2753094961"/>
+        <p14:creationId xmlns:p14="http://schemas.microsoft.com/office/powerpoint/2010/main" val="3315138329"/>
       </p:ext>
     </p:extLst>
   </p:cSld>
@@ -2748,7 +2748,7 @@
           <a:p>
             <a:fld id="{D87F77A1-31FB-DD4B-A95B-1A3ED477B6E2}" type="datetimeFigureOut">
               <a:rPr lang="en-US" smtClean="0"/>
-              <a:t>12/13/18</a:t>
+              <a:t>12/13/2018</a:t>
             </a:fld>
             <a:endParaRPr lang="en-US"/>
           </a:p>
@@ -2799,7 +2799,7 @@
     </p:spTree>
     <p:extLst>
       <p:ext uri="{BB962C8B-B14F-4D97-AF65-F5344CB8AC3E}">
-        <p14:creationId xmlns:p14="http://schemas.microsoft.com/office/powerpoint/2010/main" val="2738067858"/>
+        <p14:creationId xmlns:p14="http://schemas.microsoft.com/office/powerpoint/2010/main" val="3837594952"/>
       </p:ext>
     </p:extLst>
   </p:cSld>
@@ -2838,15 +2838,15 @@
         </p:nvSpPr>
         <p:spPr>
           <a:xfrm>
-            <a:off x="610924" y="274320"/>
-            <a:ext cx="2860600" cy="960120"/>
+            <a:off x="944762" y="457200"/>
+            <a:ext cx="4423767" cy="1600200"/>
           </a:xfrm>
         </p:spPr>
         <p:txBody>
           <a:bodyPr anchor="b"/>
           <a:lstStyle>
             <a:lvl1pPr>
-              <a:defRPr sz="1920"/>
+              <a:defRPr sz="3200"/>
             </a:lvl1pPr>
           </a:lstStyle>
           <a:p>
@@ -2870,39 +2870,39 @@
         </p:nvSpPr>
         <p:spPr>
           <a:xfrm>
-            <a:off x="3770635" y="592455"/>
-            <a:ext cx="4490115" cy="2924175"/>
+            <a:off x="5831087" y="987426"/>
+            <a:ext cx="6943725" cy="4873625"/>
           </a:xfrm>
         </p:spPr>
         <p:txBody>
           <a:bodyPr/>
           <a:lstStyle>
             <a:lvl1pPr>
-              <a:defRPr sz="1920"/>
+              <a:defRPr sz="3200"/>
             </a:lvl1pPr>
             <a:lvl2pPr>
-              <a:defRPr sz="1680"/>
+              <a:defRPr sz="2800"/>
             </a:lvl2pPr>
             <a:lvl3pPr>
-              <a:defRPr sz="1440"/>
+              <a:defRPr sz="2400"/>
             </a:lvl3pPr>
             <a:lvl4pPr>
-              <a:defRPr sz="1200"/>
+              <a:defRPr sz="2000"/>
             </a:lvl4pPr>
             <a:lvl5pPr>
-              <a:defRPr sz="1200"/>
+              <a:defRPr sz="2000"/>
             </a:lvl5pPr>
             <a:lvl6pPr>
-              <a:defRPr sz="1200"/>
+              <a:defRPr sz="2000"/>
             </a:lvl6pPr>
             <a:lvl7pPr>
-              <a:defRPr sz="1200"/>
+              <a:defRPr sz="2000"/>
             </a:lvl7pPr>
             <a:lvl8pPr>
-              <a:defRPr sz="1200"/>
+              <a:defRPr sz="2000"/>
             </a:lvl8pPr>
             <a:lvl9pPr>
-              <a:defRPr sz="1200"/>
+              <a:defRPr sz="2000"/>
             </a:lvl9pPr>
           </a:lstStyle>
           <a:p>
@@ -2955,8 +2955,8 @@
         </p:nvSpPr>
         <p:spPr>
           <a:xfrm>
-            <a:off x="610924" y="1234440"/>
-            <a:ext cx="2860600" cy="2286953"/>
+            <a:off x="944762" y="2057400"/>
+            <a:ext cx="4423767" cy="3811588"/>
           </a:xfrm>
         </p:spPr>
         <p:txBody>
@@ -2964,39 +2964,39 @@
           <a:lstStyle>
             <a:lvl1pPr marL="0" indent="0">
               <a:buNone/>
-              <a:defRPr sz="960"/>
+              <a:defRPr sz="1600"/>
             </a:lvl1pPr>
-            <a:lvl2pPr marL="274320" indent="0">
-              <a:buNone/>
-              <a:defRPr sz="840"/>
+            <a:lvl2pPr marL="457200" indent="0">
+              <a:buNone/>
+              <a:defRPr sz="1400"/>
             </a:lvl2pPr>
-            <a:lvl3pPr marL="548640" indent="0">
-              <a:buNone/>
-              <a:defRPr sz="720"/>
+            <a:lvl3pPr marL="914400" indent="0">
+              <a:buNone/>
+              <a:defRPr sz="1200"/>
             </a:lvl3pPr>
-            <a:lvl4pPr marL="822960" indent="0">
-              <a:buNone/>
-              <a:defRPr sz="600"/>
+            <a:lvl4pPr marL="1371600" indent="0">
+              <a:buNone/>
+              <a:defRPr sz="1000"/>
             </a:lvl4pPr>
-            <a:lvl5pPr marL="1097280" indent="0">
-              <a:buNone/>
-              <a:defRPr sz="600"/>
+            <a:lvl5pPr marL="1828800" indent="0">
+              <a:buNone/>
+              <a:defRPr sz="1000"/>
             </a:lvl5pPr>
-            <a:lvl6pPr marL="1371600" indent="0">
-              <a:buNone/>
-              <a:defRPr sz="600"/>
+            <a:lvl6pPr marL="2286000" indent="0">
+              <a:buNone/>
+              <a:defRPr sz="1000"/>
             </a:lvl6pPr>
-            <a:lvl7pPr marL="1645920" indent="0">
-              <a:buNone/>
-              <a:defRPr sz="600"/>
+            <a:lvl7pPr marL="2743200" indent="0">
+              <a:buNone/>
+              <a:defRPr sz="1000"/>
             </a:lvl7pPr>
-            <a:lvl8pPr marL="1920240" indent="0">
-              <a:buNone/>
-              <a:defRPr sz="600"/>
+            <a:lvl8pPr marL="3200400" indent="0">
+              <a:buNone/>
+              <a:defRPr sz="1000"/>
             </a:lvl8pPr>
-            <a:lvl9pPr marL="2194560" indent="0">
-              <a:buNone/>
-              <a:defRPr sz="600"/>
+            <a:lvl9pPr marL="3657600" indent="0">
+              <a:buNone/>
+              <a:defRPr sz="1000"/>
             </a:lvl9pPr>
           </a:lstStyle>
           <a:p>
@@ -3025,7 +3025,7 @@
           <a:p>
             <a:fld id="{D87F77A1-31FB-DD4B-A95B-1A3ED477B6E2}" type="datetimeFigureOut">
               <a:rPr lang="en-US" smtClean="0"/>
-              <a:t>12/13/18</a:t>
+              <a:t>12/13/2018</a:t>
             </a:fld>
             <a:endParaRPr lang="en-US"/>
           </a:p>
@@ -3076,7 +3076,7 @@
     </p:spTree>
     <p:extLst>
       <p:ext uri="{BB962C8B-B14F-4D97-AF65-F5344CB8AC3E}">
-        <p14:creationId xmlns:p14="http://schemas.microsoft.com/office/powerpoint/2010/main" val="3802427617"/>
+        <p14:creationId xmlns:p14="http://schemas.microsoft.com/office/powerpoint/2010/main" val="531164624"/>
       </p:ext>
     </p:extLst>
   </p:cSld>
@@ -3121,8 +3121,8 @@
         </p:nvSpPr>
         <p:spPr>
           <a:xfrm>
-            <a:off x="609770" y="219076"/>
-            <a:ext cx="7649826" cy="795338"/>
+            <a:off x="942978" y="365127"/>
+            <a:ext cx="11830051" cy="1325563"/>
           </a:xfrm>
           <a:prstGeom prst="rect">
             <a:avLst/>
@@ -3157,8 +3157,8 @@
         </p:nvSpPr>
         <p:spPr>
           <a:xfrm>
-            <a:off x="609770" y="1095376"/>
-            <a:ext cx="7649826" cy="2610803"/>
+            <a:off x="942978" y="1825631"/>
+            <a:ext cx="11830051" cy="4351338"/>
           </a:xfrm>
           <a:prstGeom prst="rect">
             <a:avLst/>
@@ -3222,8 +3222,8 @@
         </p:nvSpPr>
         <p:spPr>
           <a:xfrm>
-            <a:off x="609769" y="3813812"/>
-            <a:ext cx="1995607" cy="219075"/>
+            <a:off x="942979" y="6356359"/>
+            <a:ext cx="3086101" cy="365125"/>
           </a:xfrm>
           <a:prstGeom prst="rect">
             <a:avLst/>
@@ -3235,7 +3235,7 @@
           <a:p>
             <a:fld id="{D87F77A1-31FB-DD4B-A95B-1A3ED477B6E2}" type="datetimeFigureOut">
               <a:rPr lang="en-US" smtClean="0"/>
-              <a:t>12/13/18</a:t>
+              <a:t>12/13/2018</a:t>
             </a:fld>
             <a:endParaRPr lang="en-US"/>
           </a:p>
@@ -3259,8 +3259,8 @@
         </p:nvSpPr>
         <p:spPr>
           <a:xfrm>
-            <a:off x="2937978" y="3813812"/>
-            <a:ext cx="2993410" cy="219075"/>
+            <a:off x="4543427" y="6356359"/>
+            <a:ext cx="4629150" cy="365125"/>
           </a:xfrm>
           <a:prstGeom prst="rect">
             <a:avLst/>
@@ -3292,8 +3292,8 @@
         </p:nvSpPr>
         <p:spPr>
           <a:xfrm>
-            <a:off x="6263988" y="3813812"/>
-            <a:ext cx="1995607" cy="219075"/>
+            <a:off x="9686929" y="6356359"/>
+            <a:ext cx="3086101" cy="365125"/>
           </a:xfrm>
           <a:prstGeom prst="rect">
             <a:avLst/>
@@ -3353,15 +3353,15 @@
         </p:nvSpPr>
         <p:spPr>
           <a:xfrm>
-            <a:off x="610924" y="274320"/>
-            <a:ext cx="2860600" cy="960120"/>
+            <a:off x="944762" y="457200"/>
+            <a:ext cx="4423767" cy="1600200"/>
           </a:xfrm>
         </p:spPr>
         <p:txBody>
           <a:bodyPr anchor="b"/>
           <a:lstStyle>
             <a:lvl1pPr>
-              <a:defRPr sz="1920"/>
+              <a:defRPr sz="3200"/>
             </a:lvl1pPr>
           </a:lstStyle>
           <a:p>
@@ -3385,8 +3385,8 @@
         </p:nvSpPr>
         <p:spPr>
           <a:xfrm>
-            <a:off x="3770635" y="592455"/>
-            <a:ext cx="4490115" cy="2924175"/>
+            <a:off x="5831087" y="987426"/>
+            <a:ext cx="6943725" cy="4873625"/>
           </a:xfrm>
         </p:spPr>
         <p:txBody>
@@ -3394,39 +3394,39 @@
           <a:lstStyle>
             <a:lvl1pPr marL="0" indent="0">
               <a:buNone/>
-              <a:defRPr sz="1920"/>
+              <a:defRPr sz="3200"/>
             </a:lvl1pPr>
-            <a:lvl2pPr marL="274320" indent="0">
-              <a:buNone/>
-              <a:defRPr sz="1680"/>
+            <a:lvl2pPr marL="457200" indent="0">
+              <a:buNone/>
+              <a:defRPr sz="2800"/>
             </a:lvl2pPr>
-            <a:lvl3pPr marL="548640" indent="0">
-              <a:buNone/>
-              <a:defRPr sz="1440"/>
+            <a:lvl3pPr marL="914400" indent="0">
+              <a:buNone/>
+              <a:defRPr sz="2400"/>
             </a:lvl3pPr>
-            <a:lvl4pPr marL="822960" indent="0">
-              <a:buNone/>
-              <a:defRPr sz="1200"/>
+            <a:lvl4pPr marL="1371600" indent="0">
+              <a:buNone/>
+              <a:defRPr sz="2000"/>
             </a:lvl4pPr>
-            <a:lvl5pPr marL="1097280" indent="0">
-              <a:buNone/>
-              <a:defRPr sz="1200"/>
+            <a:lvl5pPr marL="1828800" indent="0">
+              <a:buNone/>
+              <a:defRPr sz="2000"/>
             </a:lvl5pPr>
-            <a:lvl6pPr marL="1371600" indent="0">
-              <a:buNone/>
-              <a:defRPr sz="1200"/>
+            <a:lvl6pPr marL="2286000" indent="0">
+              <a:buNone/>
+              <a:defRPr sz="2000"/>
             </a:lvl6pPr>
-            <a:lvl7pPr marL="1645920" indent="0">
-              <a:buNone/>
-              <a:defRPr sz="1200"/>
+            <a:lvl7pPr marL="2743200" indent="0">
+              <a:buNone/>
+              <a:defRPr sz="2000"/>
             </a:lvl7pPr>
-            <a:lvl8pPr marL="1920240" indent="0">
-              <a:buNone/>
-              <a:defRPr sz="1200"/>
+            <a:lvl8pPr marL="3200400" indent="0">
+              <a:buNone/>
+              <a:defRPr sz="2000"/>
             </a:lvl8pPr>
-            <a:lvl9pPr marL="2194560" indent="0">
-              <a:buNone/>
-              <a:defRPr sz="1200"/>
+            <a:lvl9pPr marL="3657600" indent="0">
+              <a:buNone/>
+              <a:defRPr sz="2000"/>
             </a:lvl9pPr>
           </a:lstStyle>
           <a:p>
@@ -3450,8 +3450,8 @@
         </p:nvSpPr>
         <p:spPr>
           <a:xfrm>
-            <a:off x="610924" y="1234440"/>
-            <a:ext cx="2860600" cy="2286953"/>
+            <a:off x="944762" y="2057400"/>
+            <a:ext cx="4423767" cy="3811588"/>
           </a:xfrm>
         </p:spPr>
         <p:txBody>
@@ -3459,39 +3459,39 @@
           <a:lstStyle>
             <a:lvl1pPr marL="0" indent="0">
               <a:buNone/>
-              <a:defRPr sz="960"/>
+              <a:defRPr sz="1600"/>
             </a:lvl1pPr>
-            <a:lvl2pPr marL="274320" indent="0">
-              <a:buNone/>
-              <a:defRPr sz="840"/>
+            <a:lvl2pPr marL="457200" indent="0">
+              <a:buNone/>
+              <a:defRPr sz="1400"/>
             </a:lvl2pPr>
-            <a:lvl3pPr marL="548640" indent="0">
-              <a:buNone/>
-              <a:defRPr sz="720"/>
+            <a:lvl3pPr marL="914400" indent="0">
+              <a:buNone/>
+              <a:defRPr sz="1200"/>
             </a:lvl3pPr>
-            <a:lvl4pPr marL="822960" indent="0">
-              <a:buNone/>
-              <a:defRPr sz="600"/>
+            <a:lvl4pPr marL="1371600" indent="0">
+              <a:buNone/>
+              <a:defRPr sz="1000"/>
             </a:lvl4pPr>
-            <a:lvl5pPr marL="1097280" indent="0">
-              <a:buNone/>
-              <a:defRPr sz="600"/>
+            <a:lvl5pPr marL="1828800" indent="0">
+              <a:buNone/>
+              <a:defRPr sz="1000"/>
             </a:lvl5pPr>
-            <a:lvl6pPr marL="1371600" indent="0">
-              <a:buNone/>
-              <a:defRPr sz="600"/>
+            <a:lvl6pPr marL="2286000" indent="0">
+              <a:buNone/>
+              <a:defRPr sz="1000"/>
             </a:lvl6pPr>
-            <a:lvl7pPr marL="1645920" indent="0">
-              <a:buNone/>
-              <a:defRPr sz="600"/>
+            <a:lvl7pPr marL="2743200" indent="0">
+              <a:buNone/>
+              <a:defRPr sz="1000"/>
             </a:lvl7pPr>
-            <a:lvl8pPr marL="1920240" indent="0">
-              <a:buNone/>
-              <a:defRPr sz="600"/>
+            <a:lvl8pPr marL="3200400" indent="0">
+              <a:buNone/>
+              <a:defRPr sz="1000"/>
             </a:lvl8pPr>
-            <a:lvl9pPr marL="2194560" indent="0">
-              <a:buNone/>
-              <a:defRPr sz="600"/>
+            <a:lvl9pPr marL="3657600" indent="0">
+              <a:buNone/>
+              <a:defRPr sz="1000"/>
             </a:lvl9pPr>
           </a:lstStyle>
           <a:p>
@@ -3520,7 +3520,7 @@
           <a:p>
             <a:fld id="{D87F77A1-31FB-DD4B-A95B-1A3ED477B6E2}" type="datetimeFigureOut">
               <a:rPr lang="en-US" smtClean="0"/>
-              <a:t>12/13/18</a:t>
+              <a:t>12/13/2018</a:t>
             </a:fld>
             <a:endParaRPr lang="en-US"/>
           </a:p>
@@ -3571,7 +3571,7 @@
     </p:spTree>
     <p:extLst>
       <p:ext uri="{BB962C8B-B14F-4D97-AF65-F5344CB8AC3E}">
-        <p14:creationId xmlns:p14="http://schemas.microsoft.com/office/powerpoint/2010/main" val="4279141802"/>
+        <p14:creationId xmlns:p14="http://schemas.microsoft.com/office/powerpoint/2010/main" val="3149163496"/>
       </p:ext>
     </p:extLst>
   </p:cSld>
@@ -3690,7 +3690,7 @@
           <a:p>
             <a:fld id="{D87F77A1-31FB-DD4B-A95B-1A3ED477B6E2}" type="datetimeFigureOut">
               <a:rPr lang="en-US" smtClean="0"/>
-              <a:t>12/13/18</a:t>
+              <a:t>12/13/2018</a:t>
             </a:fld>
             <a:endParaRPr lang="en-US"/>
           </a:p>
@@ -3741,7 +3741,7 @@
     </p:spTree>
     <p:extLst>
       <p:ext uri="{BB962C8B-B14F-4D97-AF65-F5344CB8AC3E}">
-        <p14:creationId xmlns:p14="http://schemas.microsoft.com/office/powerpoint/2010/main" val="3276511804"/>
+        <p14:creationId xmlns:p14="http://schemas.microsoft.com/office/powerpoint/2010/main" val="1911590746"/>
       </p:ext>
     </p:extLst>
   </p:cSld>
@@ -3780,8 +3780,8 @@
         </p:nvSpPr>
         <p:spPr>
           <a:xfrm>
-            <a:off x="6347138" y="219075"/>
-            <a:ext cx="1912456" cy="3487103"/>
+            <a:off x="9815512" y="365125"/>
+            <a:ext cx="2957513" cy="5811838"/>
           </a:xfrm>
         </p:spPr>
         <p:txBody>
@@ -3808,8 +3808,8 @@
         </p:nvSpPr>
         <p:spPr>
           <a:xfrm>
-            <a:off x="609769" y="219075"/>
-            <a:ext cx="5626502" cy="3487103"/>
+            <a:off x="942975" y="365125"/>
+            <a:ext cx="8701088" cy="5811838"/>
           </a:xfrm>
         </p:spPr>
         <p:txBody>
@@ -3870,7 +3870,7 @@
           <a:p>
             <a:fld id="{D87F77A1-31FB-DD4B-A95B-1A3ED477B6E2}" type="datetimeFigureOut">
               <a:rPr lang="en-US" smtClean="0"/>
-              <a:t>12/13/18</a:t>
+              <a:t>12/13/2018</a:t>
             </a:fld>
             <a:endParaRPr lang="en-US"/>
           </a:p>
@@ -3921,7 +3921,7 @@
     </p:spTree>
     <p:extLst>
       <p:ext uri="{BB962C8B-B14F-4D97-AF65-F5344CB8AC3E}">
-        <p14:creationId xmlns:p14="http://schemas.microsoft.com/office/powerpoint/2010/main" val="393519203"/>
+        <p14:creationId xmlns:p14="http://schemas.microsoft.com/office/powerpoint/2010/main" val="922198614"/>
       </p:ext>
     </p:extLst>
   </p:cSld>
@@ -3966,8 +3966,8 @@
         </p:nvSpPr>
         <p:spPr>
           <a:xfrm>
-            <a:off x="605150" y="1025845"/>
-            <a:ext cx="7649826" cy="1711643"/>
+            <a:off x="935833" y="1709746"/>
+            <a:ext cx="11830051" cy="2852739"/>
           </a:xfrm>
           <a:prstGeom prst="rect">
             <a:avLst/>
@@ -4006,8 +4006,8 @@
         </p:nvSpPr>
         <p:spPr>
           <a:xfrm>
-            <a:off x="605150" y="2753679"/>
-            <a:ext cx="7649826" cy="900113"/>
+            <a:off x="935833" y="4589468"/>
+            <a:ext cx="11830051" cy="1500189"/>
           </a:xfrm>
           <a:prstGeom prst="rect">
             <a:avLst/>
@@ -4134,8 +4134,8 @@
         </p:nvSpPr>
         <p:spPr>
           <a:xfrm>
-            <a:off x="609769" y="3813812"/>
-            <a:ext cx="1995607" cy="219075"/>
+            <a:off x="942979" y="6356359"/>
+            <a:ext cx="3086101" cy="365125"/>
           </a:xfrm>
           <a:prstGeom prst="rect">
             <a:avLst/>
@@ -4147,7 +4147,7 @@
           <a:p>
             <a:fld id="{D87F77A1-31FB-DD4B-A95B-1A3ED477B6E2}" type="datetimeFigureOut">
               <a:rPr lang="en-US" smtClean="0"/>
-              <a:t>12/13/18</a:t>
+              <a:t>12/13/2018</a:t>
             </a:fld>
             <a:endParaRPr lang="en-US"/>
           </a:p>
@@ -4171,8 +4171,8 @@
         </p:nvSpPr>
         <p:spPr>
           <a:xfrm>
-            <a:off x="2937978" y="3813812"/>
-            <a:ext cx="2993410" cy="219075"/>
+            <a:off x="4543427" y="6356359"/>
+            <a:ext cx="4629150" cy="365125"/>
           </a:xfrm>
           <a:prstGeom prst="rect">
             <a:avLst/>
@@ -4204,8 +4204,8 @@
         </p:nvSpPr>
         <p:spPr>
           <a:xfrm>
-            <a:off x="6263988" y="3813812"/>
-            <a:ext cx="1995607" cy="219075"/>
+            <a:off x="9686929" y="6356359"/>
+            <a:ext cx="3086101" cy="365125"/>
           </a:xfrm>
           <a:prstGeom prst="rect">
             <a:avLst/>
@@ -4271,8 +4271,8 @@
         </p:nvSpPr>
         <p:spPr>
           <a:xfrm>
-            <a:off x="609770" y="219076"/>
-            <a:ext cx="7649826" cy="795338"/>
+            <a:off x="942978" y="365127"/>
+            <a:ext cx="11830051" cy="1325563"/>
           </a:xfrm>
           <a:prstGeom prst="rect">
             <a:avLst/>
@@ -4307,8 +4307,8 @@
         </p:nvSpPr>
         <p:spPr>
           <a:xfrm>
-            <a:off x="609769" y="1095376"/>
-            <a:ext cx="3769479" cy="2610803"/>
+            <a:off x="942976" y="1825631"/>
+            <a:ext cx="5829300" cy="4351338"/>
           </a:xfrm>
           <a:prstGeom prst="rect">
             <a:avLst/>
@@ -4372,8 +4372,8 @@
         </p:nvSpPr>
         <p:spPr>
           <a:xfrm>
-            <a:off x="4490116" y="1095376"/>
-            <a:ext cx="3769479" cy="2610803"/>
+            <a:off x="6943727" y="1825631"/>
+            <a:ext cx="5829300" cy="4351338"/>
           </a:xfrm>
           <a:prstGeom prst="rect">
             <a:avLst/>
@@ -4437,8 +4437,8 @@
         </p:nvSpPr>
         <p:spPr>
           <a:xfrm>
-            <a:off x="609769" y="3813812"/>
-            <a:ext cx="1995607" cy="219075"/>
+            <a:off x="942979" y="6356359"/>
+            <a:ext cx="3086101" cy="365125"/>
           </a:xfrm>
           <a:prstGeom prst="rect">
             <a:avLst/>
@@ -4450,7 +4450,7 @@
           <a:p>
             <a:fld id="{D87F77A1-31FB-DD4B-A95B-1A3ED477B6E2}" type="datetimeFigureOut">
               <a:rPr lang="en-US" smtClean="0"/>
-              <a:t>12/13/18</a:t>
+              <a:t>12/13/2018</a:t>
             </a:fld>
             <a:endParaRPr lang="en-US"/>
           </a:p>
@@ -4474,8 +4474,8 @@
         </p:nvSpPr>
         <p:spPr>
           <a:xfrm>
-            <a:off x="2937978" y="3813812"/>
-            <a:ext cx="2993410" cy="219075"/>
+            <a:off x="4543427" y="6356359"/>
+            <a:ext cx="4629150" cy="365125"/>
           </a:xfrm>
           <a:prstGeom prst="rect">
             <a:avLst/>
@@ -4507,8 +4507,8 @@
         </p:nvSpPr>
         <p:spPr>
           <a:xfrm>
-            <a:off x="6263988" y="3813812"/>
-            <a:ext cx="1995607" cy="219075"/>
+            <a:off x="9686929" y="6356359"/>
+            <a:ext cx="3086101" cy="365125"/>
           </a:xfrm>
           <a:prstGeom prst="rect">
             <a:avLst/>
@@ -4574,8 +4574,8 @@
         </p:nvSpPr>
         <p:spPr>
           <a:xfrm>
-            <a:off x="610924" y="219076"/>
-            <a:ext cx="7649826" cy="795338"/>
+            <a:off x="944762" y="365127"/>
+            <a:ext cx="11830051" cy="1325563"/>
           </a:xfrm>
           <a:prstGeom prst="rect">
             <a:avLst/>
@@ -4610,8 +4610,8 @@
         </p:nvSpPr>
         <p:spPr>
           <a:xfrm>
-            <a:off x="610925" y="1008698"/>
-            <a:ext cx="3752156" cy="494348"/>
+            <a:off x="944763" y="1681163"/>
+            <a:ext cx="5802510" cy="823914"/>
           </a:xfrm>
           <a:prstGeom prst="rect">
             <a:avLst/>
@@ -4684,8 +4684,8 @@
         </p:nvSpPr>
         <p:spPr>
           <a:xfrm>
-            <a:off x="610925" y="1503046"/>
-            <a:ext cx="3752156" cy="2210753"/>
+            <a:off x="944763" y="2505082"/>
+            <a:ext cx="5802510" cy="3684588"/>
           </a:xfrm>
           <a:prstGeom prst="rect">
             <a:avLst/>
@@ -4749,8 +4749,8 @@
         </p:nvSpPr>
         <p:spPr>
           <a:xfrm>
-            <a:off x="4490116" y="1008698"/>
-            <a:ext cx="3770634" cy="494348"/>
+            <a:off x="6943726" y="1681163"/>
+            <a:ext cx="5831086" cy="823914"/>
           </a:xfrm>
           <a:prstGeom prst="rect">
             <a:avLst/>
@@ -4823,8 +4823,8 @@
         </p:nvSpPr>
         <p:spPr>
           <a:xfrm>
-            <a:off x="4490116" y="1503046"/>
-            <a:ext cx="3770634" cy="2210753"/>
+            <a:off x="6943726" y="2505082"/>
+            <a:ext cx="5831086" cy="3684588"/>
           </a:xfrm>
           <a:prstGeom prst="rect">
             <a:avLst/>
@@ -4888,8 +4888,8 @@
         </p:nvSpPr>
         <p:spPr>
           <a:xfrm>
-            <a:off x="609769" y="3813812"/>
-            <a:ext cx="1995607" cy="219075"/>
+            <a:off x="942979" y="6356359"/>
+            <a:ext cx="3086101" cy="365125"/>
           </a:xfrm>
           <a:prstGeom prst="rect">
             <a:avLst/>
@@ -4901,7 +4901,7 @@
           <a:p>
             <a:fld id="{D87F77A1-31FB-DD4B-A95B-1A3ED477B6E2}" type="datetimeFigureOut">
               <a:rPr lang="en-US" smtClean="0"/>
-              <a:t>12/13/18</a:t>
+              <a:t>12/13/2018</a:t>
             </a:fld>
             <a:endParaRPr lang="en-US"/>
           </a:p>
@@ -4925,8 +4925,8 @@
         </p:nvSpPr>
         <p:spPr>
           <a:xfrm>
-            <a:off x="2937978" y="3813812"/>
-            <a:ext cx="2993410" cy="219075"/>
+            <a:off x="4543427" y="6356359"/>
+            <a:ext cx="4629150" cy="365125"/>
           </a:xfrm>
           <a:prstGeom prst="rect">
             <a:avLst/>
@@ -4958,8 +4958,8 @@
         </p:nvSpPr>
         <p:spPr>
           <a:xfrm>
-            <a:off x="6263988" y="3813812"/>
-            <a:ext cx="1995607" cy="219075"/>
+            <a:off x="9686929" y="6356359"/>
+            <a:ext cx="3086101" cy="365125"/>
           </a:xfrm>
           <a:prstGeom prst="rect">
             <a:avLst/>
@@ -5025,8 +5025,8 @@
         </p:nvSpPr>
         <p:spPr>
           <a:xfrm>
-            <a:off x="609770" y="219076"/>
-            <a:ext cx="7649826" cy="795338"/>
+            <a:off x="942978" y="365127"/>
+            <a:ext cx="11830051" cy="1325563"/>
           </a:xfrm>
           <a:prstGeom prst="rect">
             <a:avLst/>
@@ -5061,8 +5061,8 @@
         </p:nvSpPr>
         <p:spPr>
           <a:xfrm>
-            <a:off x="609769" y="3813812"/>
-            <a:ext cx="1995607" cy="219075"/>
+            <a:off x="942979" y="6356359"/>
+            <a:ext cx="3086101" cy="365125"/>
           </a:xfrm>
           <a:prstGeom prst="rect">
             <a:avLst/>
@@ -5074,7 +5074,7 @@
           <a:p>
             <a:fld id="{D87F77A1-31FB-DD4B-A95B-1A3ED477B6E2}" type="datetimeFigureOut">
               <a:rPr lang="en-US" smtClean="0"/>
-              <a:t>12/13/18</a:t>
+              <a:t>12/13/2018</a:t>
             </a:fld>
             <a:endParaRPr lang="en-US"/>
           </a:p>
@@ -5098,8 +5098,8 @@
         </p:nvSpPr>
         <p:spPr>
           <a:xfrm>
-            <a:off x="2937978" y="3813812"/>
-            <a:ext cx="2993410" cy="219075"/>
+            <a:off x="4543427" y="6356359"/>
+            <a:ext cx="4629150" cy="365125"/>
           </a:xfrm>
           <a:prstGeom prst="rect">
             <a:avLst/>
@@ -5131,8 +5131,8 @@
         </p:nvSpPr>
         <p:spPr>
           <a:xfrm>
-            <a:off x="6263988" y="3813812"/>
-            <a:ext cx="1995607" cy="219075"/>
+            <a:off x="9686929" y="6356359"/>
+            <a:ext cx="3086101" cy="365125"/>
           </a:xfrm>
           <a:prstGeom prst="rect">
             <a:avLst/>
@@ -5198,8 +5198,8 @@
         </p:nvSpPr>
         <p:spPr>
           <a:xfrm>
-            <a:off x="609769" y="3813812"/>
-            <a:ext cx="1995607" cy="219075"/>
+            <a:off x="942979" y="6356359"/>
+            <a:ext cx="3086101" cy="365125"/>
           </a:xfrm>
           <a:prstGeom prst="rect">
             <a:avLst/>
@@ -5211,7 +5211,7 @@
           <a:p>
             <a:fld id="{D87F77A1-31FB-DD4B-A95B-1A3ED477B6E2}" type="datetimeFigureOut">
               <a:rPr lang="en-US" smtClean="0"/>
-              <a:t>12/13/18</a:t>
+              <a:t>12/13/2018</a:t>
             </a:fld>
             <a:endParaRPr lang="en-US"/>
           </a:p>
@@ -5235,8 +5235,8 @@
         </p:nvSpPr>
         <p:spPr>
           <a:xfrm>
-            <a:off x="2937978" y="3813812"/>
-            <a:ext cx="2993410" cy="219075"/>
+            <a:off x="4543427" y="6356359"/>
+            <a:ext cx="4629150" cy="365125"/>
           </a:xfrm>
           <a:prstGeom prst="rect">
             <a:avLst/>
@@ -5268,8 +5268,8 @@
         </p:nvSpPr>
         <p:spPr>
           <a:xfrm>
-            <a:off x="6263988" y="3813812"/>
-            <a:ext cx="1995607" cy="219075"/>
+            <a:off x="9686929" y="6356359"/>
+            <a:ext cx="3086101" cy="365125"/>
           </a:xfrm>
           <a:prstGeom prst="rect">
             <a:avLst/>
@@ -5335,8 +5335,8 @@
         </p:nvSpPr>
         <p:spPr>
           <a:xfrm>
-            <a:off x="610925" y="274320"/>
-            <a:ext cx="2860600" cy="960120"/>
+            <a:off x="944763" y="457200"/>
+            <a:ext cx="4423766" cy="1600200"/>
           </a:xfrm>
           <a:prstGeom prst="rect">
             <a:avLst/>
@@ -5375,8 +5375,8 @@
         </p:nvSpPr>
         <p:spPr>
           <a:xfrm>
-            <a:off x="3770634" y="592457"/>
-            <a:ext cx="4490116" cy="2924175"/>
+            <a:off x="5831086" y="987434"/>
+            <a:ext cx="6943727" cy="4873625"/>
           </a:xfrm>
           <a:prstGeom prst="rect">
             <a:avLst/>
@@ -5468,8 +5468,8 @@
         </p:nvSpPr>
         <p:spPr>
           <a:xfrm>
-            <a:off x="610925" y="1234442"/>
-            <a:ext cx="2860600" cy="2286953"/>
+            <a:off x="944763" y="2057407"/>
+            <a:ext cx="4423766" cy="3811588"/>
           </a:xfrm>
           <a:prstGeom prst="rect">
             <a:avLst/>
@@ -5542,8 +5542,8 @@
         </p:nvSpPr>
         <p:spPr>
           <a:xfrm>
-            <a:off x="609769" y="3813812"/>
-            <a:ext cx="1995607" cy="219075"/>
+            <a:off x="942979" y="6356359"/>
+            <a:ext cx="3086101" cy="365125"/>
           </a:xfrm>
           <a:prstGeom prst="rect">
             <a:avLst/>
@@ -5555,7 +5555,7 @@
           <a:p>
             <a:fld id="{D87F77A1-31FB-DD4B-A95B-1A3ED477B6E2}" type="datetimeFigureOut">
               <a:rPr lang="en-US" smtClean="0"/>
-              <a:t>12/13/18</a:t>
+              <a:t>12/13/2018</a:t>
             </a:fld>
             <a:endParaRPr lang="en-US"/>
           </a:p>
@@ -5579,8 +5579,8 @@
         </p:nvSpPr>
         <p:spPr>
           <a:xfrm>
-            <a:off x="2937978" y="3813812"/>
-            <a:ext cx="2993410" cy="219075"/>
+            <a:off x="4543427" y="6356359"/>
+            <a:ext cx="4629150" cy="365125"/>
           </a:xfrm>
           <a:prstGeom prst="rect">
             <a:avLst/>
@@ -5612,8 +5612,8 @@
         </p:nvSpPr>
         <p:spPr>
           <a:xfrm>
-            <a:off x="6263988" y="3813812"/>
-            <a:ext cx="1995607" cy="219075"/>
+            <a:off x="9686929" y="6356359"/>
+            <a:ext cx="3086101" cy="365125"/>
           </a:xfrm>
           <a:prstGeom prst="rect">
             <a:avLst/>
@@ -5679,8 +5679,8 @@
         </p:nvSpPr>
         <p:spPr>
           <a:xfrm>
-            <a:off x="610925" y="274320"/>
-            <a:ext cx="2860600" cy="960120"/>
+            <a:off x="944763" y="457200"/>
+            <a:ext cx="4423766" cy="1600200"/>
           </a:xfrm>
           <a:prstGeom prst="rect">
             <a:avLst/>
@@ -5719,8 +5719,8 @@
         </p:nvSpPr>
         <p:spPr>
           <a:xfrm>
-            <a:off x="3770634" y="592457"/>
-            <a:ext cx="4490116" cy="2924175"/>
+            <a:off x="5831086" y="987434"/>
+            <a:ext cx="6943727" cy="4873625"/>
           </a:xfrm>
           <a:prstGeom prst="rect">
             <a:avLst/>
@@ -5789,8 +5789,8 @@
         </p:nvSpPr>
         <p:spPr>
           <a:xfrm>
-            <a:off x="610925" y="1234442"/>
-            <a:ext cx="2860600" cy="2286953"/>
+            <a:off x="944763" y="2057407"/>
+            <a:ext cx="4423766" cy="3811588"/>
           </a:xfrm>
           <a:prstGeom prst="rect">
             <a:avLst/>
@@ -5863,8 +5863,8 @@
         </p:nvSpPr>
         <p:spPr>
           <a:xfrm>
-            <a:off x="609769" y="3813812"/>
-            <a:ext cx="1995607" cy="219075"/>
+            <a:off x="942979" y="6356359"/>
+            <a:ext cx="3086101" cy="365125"/>
           </a:xfrm>
           <a:prstGeom prst="rect">
             <a:avLst/>
@@ -5876,7 +5876,7 @@
           <a:p>
             <a:fld id="{D87F77A1-31FB-DD4B-A95B-1A3ED477B6E2}" type="datetimeFigureOut">
               <a:rPr lang="en-US" smtClean="0"/>
-              <a:t>12/13/18</a:t>
+              <a:t>12/13/2018</a:t>
             </a:fld>
             <a:endParaRPr lang="en-US"/>
           </a:p>
@@ -5900,8 +5900,8 @@
         </p:nvSpPr>
         <p:spPr>
           <a:xfrm>
-            <a:off x="2937978" y="3813812"/>
-            <a:ext cx="2993410" cy="219075"/>
+            <a:off x="4543427" y="6356359"/>
+            <a:ext cx="4629150" cy="365125"/>
           </a:xfrm>
           <a:prstGeom prst="rect">
             <a:avLst/>
@@ -5933,8 +5933,8 @@
         </p:nvSpPr>
         <p:spPr>
           <a:xfrm>
-            <a:off x="6263988" y="3813812"/>
-            <a:ext cx="1995607" cy="219075"/>
+            <a:off x="9686929" y="6356359"/>
+            <a:ext cx="3086101" cy="365125"/>
           </a:xfrm>
           <a:prstGeom prst="rect">
             <a:avLst/>
@@ -6325,8 +6325,8 @@
         </p:nvSpPr>
         <p:spPr>
           <a:xfrm>
-            <a:off x="609769" y="219075"/>
-            <a:ext cx="7649826" cy="795338"/>
+            <a:off x="942975" y="365126"/>
+            <a:ext cx="11830050" cy="1325563"/>
           </a:xfrm>
           <a:prstGeom prst="rect">
             <a:avLst/>
@@ -6358,8 +6358,8 @@
         </p:nvSpPr>
         <p:spPr>
           <a:xfrm>
-            <a:off x="609769" y="1095375"/>
-            <a:ext cx="7649826" cy="2610803"/>
+            <a:off x="942975" y="1825625"/>
+            <a:ext cx="11830050" cy="4351338"/>
           </a:xfrm>
           <a:prstGeom prst="rect">
             <a:avLst/>
@@ -6420,8 +6420,8 @@
         </p:nvSpPr>
         <p:spPr>
           <a:xfrm>
-            <a:off x="609769" y="3813810"/>
-            <a:ext cx="1995607" cy="219075"/>
+            <a:off x="942975" y="6356351"/>
+            <a:ext cx="3086100" cy="365125"/>
           </a:xfrm>
           <a:prstGeom prst="rect">
             <a:avLst/>
@@ -6431,7 +6431,7 @@
           <a:bodyPr vert="horz" lIns="91440" tIns="45720" rIns="91440" bIns="45720" rtlCol="0" anchor="ctr"/>
           <a:lstStyle>
             <a:lvl1pPr algn="l">
-              <a:defRPr sz="720">
+              <a:defRPr sz="1200">
                 <a:solidFill>
                   <a:schemeClr val="tx1">
                     <a:tint val="75000"/>
@@ -6443,7 +6443,7 @@
           <a:p>
             <a:fld id="{C764DE79-268F-4C1A-8933-263129D2AF90}" type="datetimeFigureOut">
               <a:rPr lang="en-US" dirty="0"/>
-              <a:t>12/13/18</a:t>
+              <a:t>12/13/2018</a:t>
             </a:fld>
             <a:endParaRPr lang="en-US" dirty="0"/>
           </a:p>
@@ -6461,8 +6461,8 @@
         </p:nvSpPr>
         <p:spPr>
           <a:xfrm>
-            <a:off x="2937977" y="3813810"/>
-            <a:ext cx="2993410" cy="219075"/>
+            <a:off x="4543425" y="6356351"/>
+            <a:ext cx="4629150" cy="365125"/>
           </a:xfrm>
           <a:prstGeom prst="rect">
             <a:avLst/>
@@ -6472,7 +6472,7 @@
           <a:bodyPr vert="horz" lIns="91440" tIns="45720" rIns="91440" bIns="45720" rtlCol="0" anchor="ctr"/>
           <a:lstStyle>
             <a:lvl1pPr algn="ctr">
-              <a:defRPr sz="720">
+              <a:defRPr sz="1200">
                 <a:solidFill>
                   <a:schemeClr val="tx1">
                     <a:tint val="75000"/>
@@ -6498,8 +6498,8 @@
         </p:nvSpPr>
         <p:spPr>
           <a:xfrm>
-            <a:off x="6263987" y="3813810"/>
-            <a:ext cx="1995607" cy="219075"/>
+            <a:off x="9686925" y="6356351"/>
+            <a:ext cx="3086100" cy="365125"/>
           </a:xfrm>
           <a:prstGeom prst="rect">
             <a:avLst/>
@@ -6509,7 +6509,7 @@
           <a:bodyPr vert="horz" lIns="91440" tIns="45720" rIns="91440" bIns="45720" rtlCol="0" anchor="ctr"/>
           <a:lstStyle>
             <a:lvl1pPr algn="r">
-              <a:defRPr sz="720">
+              <a:defRPr sz="1200">
                 <a:solidFill>
                   <a:schemeClr val="tx1">
                     <a:tint val="75000"/>
@@ -6530,27 +6530,27 @@
     </p:spTree>
     <p:extLst>
       <p:ext uri="{BB962C8B-B14F-4D97-AF65-F5344CB8AC3E}">
-        <p14:creationId xmlns:p14="http://schemas.microsoft.com/office/powerpoint/2010/main" val="928184864"/>
+        <p14:creationId xmlns:p14="http://schemas.microsoft.com/office/powerpoint/2010/main" val="1902018386"/>
       </p:ext>
     </p:extLst>
   </p:cSld>
   <p:clrMap bg1="lt1" tx1="dk1" bg2="lt2" tx2="dk2" accent1="accent1" accent2="accent2" accent3="accent3" accent4="accent4" accent5="accent5" accent6="accent6" hlink="hlink" folHlink="folHlink"/>
   <p:sldLayoutIdLst>
-    <p:sldLayoutId id="2147483706" r:id="rId1"/>
-    <p:sldLayoutId id="2147483707" r:id="rId2"/>
-    <p:sldLayoutId id="2147483708" r:id="rId3"/>
-    <p:sldLayoutId id="2147483709" r:id="rId4"/>
-    <p:sldLayoutId id="2147483710" r:id="rId5"/>
-    <p:sldLayoutId id="2147483711" r:id="rId6"/>
-    <p:sldLayoutId id="2147483712" r:id="rId7"/>
-    <p:sldLayoutId id="2147483713" r:id="rId8"/>
-    <p:sldLayoutId id="2147483714" r:id="rId9"/>
-    <p:sldLayoutId id="2147483715" r:id="rId10"/>
-    <p:sldLayoutId id="2147483716" r:id="rId11"/>
+    <p:sldLayoutId id="2147483730" r:id="rId1"/>
+    <p:sldLayoutId id="2147483731" r:id="rId2"/>
+    <p:sldLayoutId id="2147483732" r:id="rId3"/>
+    <p:sldLayoutId id="2147483733" r:id="rId4"/>
+    <p:sldLayoutId id="2147483734" r:id="rId5"/>
+    <p:sldLayoutId id="2147483735" r:id="rId6"/>
+    <p:sldLayoutId id="2147483736" r:id="rId7"/>
+    <p:sldLayoutId id="2147483737" r:id="rId8"/>
+    <p:sldLayoutId id="2147483738" r:id="rId9"/>
+    <p:sldLayoutId id="2147483739" r:id="rId10"/>
+    <p:sldLayoutId id="2147483740" r:id="rId11"/>
   </p:sldLayoutIdLst>
   <p:txStyles>
     <p:titleStyle>
-      <a:lvl1pPr algn="l" defTabSz="548640" rtl="0" eaLnBrk="1" latinLnBrk="0" hangingPunct="1">
+      <a:lvl1pPr algn="l" defTabSz="914400" rtl="0" eaLnBrk="1" latinLnBrk="0" hangingPunct="1">
         <a:lnSpc>
           <a:spcPct val="90000"/>
         </a:lnSpc>
@@ -6558,7 +6558,7 @@
           <a:spcPct val="0"/>
         </a:spcBef>
         <a:buNone/>
-        <a:defRPr sz="2640" kern="1200">
+        <a:defRPr sz="4400" kern="1200">
           <a:solidFill>
             <a:schemeClr val="tx1"/>
           </a:solidFill>
@@ -6569,16 +6569,16 @@
       </a:lvl1pPr>
     </p:titleStyle>
     <p:bodyStyle>
-      <a:lvl1pPr marL="137160" indent="-137160" algn="l" defTabSz="548640" rtl="0" eaLnBrk="1" latinLnBrk="0" hangingPunct="1">
+      <a:lvl1pPr marL="228600" indent="-228600" algn="l" defTabSz="914400" rtl="0" eaLnBrk="1" latinLnBrk="0" hangingPunct="1">
         <a:lnSpc>
           <a:spcPct val="90000"/>
         </a:lnSpc>
         <a:spcBef>
-          <a:spcPts val="600"/>
+          <a:spcPts val="1000"/>
         </a:spcBef>
         <a:buFont typeface="Arial" panose="020B0604020202020204" pitchFamily="34" charset="0"/>
         <a:buChar char="•"/>
-        <a:defRPr sz="1680" kern="1200">
+        <a:defRPr sz="2800" kern="1200">
           <a:solidFill>
             <a:schemeClr val="tx1"/>
           </a:solidFill>
@@ -6587,16 +6587,16 @@
           <a:cs typeface="+mn-cs"/>
         </a:defRPr>
       </a:lvl1pPr>
-      <a:lvl2pPr marL="411480" indent="-137160" algn="l" defTabSz="548640" rtl="0" eaLnBrk="1" latinLnBrk="0" hangingPunct="1">
+      <a:lvl2pPr marL="685800" indent="-228600" algn="l" defTabSz="914400" rtl="0" eaLnBrk="1" latinLnBrk="0" hangingPunct="1">
         <a:lnSpc>
           <a:spcPct val="90000"/>
         </a:lnSpc>
         <a:spcBef>
-          <a:spcPts val="300"/>
+          <a:spcPts val="500"/>
         </a:spcBef>
         <a:buFont typeface="Arial" panose="020B0604020202020204" pitchFamily="34" charset="0"/>
         <a:buChar char="•"/>
-        <a:defRPr sz="1440" kern="1200">
+        <a:defRPr sz="2400" kern="1200">
           <a:solidFill>
             <a:schemeClr val="tx1"/>
           </a:solidFill>
@@ -6605,16 +6605,16 @@
           <a:cs typeface="+mn-cs"/>
         </a:defRPr>
       </a:lvl2pPr>
-      <a:lvl3pPr marL="685800" indent="-137160" algn="l" defTabSz="548640" rtl="0" eaLnBrk="1" latinLnBrk="0" hangingPunct="1">
+      <a:lvl3pPr marL="1143000" indent="-228600" algn="l" defTabSz="914400" rtl="0" eaLnBrk="1" latinLnBrk="0" hangingPunct="1">
         <a:lnSpc>
           <a:spcPct val="90000"/>
         </a:lnSpc>
         <a:spcBef>
-          <a:spcPts val="300"/>
+          <a:spcPts val="500"/>
         </a:spcBef>
         <a:buFont typeface="Arial" panose="020B0604020202020204" pitchFamily="34" charset="0"/>
         <a:buChar char="•"/>
-        <a:defRPr sz="1200" kern="1200">
+        <a:defRPr sz="2000" kern="1200">
           <a:solidFill>
             <a:schemeClr val="tx1"/>
           </a:solidFill>
@@ -6623,16 +6623,16 @@
           <a:cs typeface="+mn-cs"/>
         </a:defRPr>
       </a:lvl3pPr>
-      <a:lvl4pPr marL="960120" indent="-137160" algn="l" defTabSz="548640" rtl="0" eaLnBrk="1" latinLnBrk="0" hangingPunct="1">
+      <a:lvl4pPr marL="1600200" indent="-228600" algn="l" defTabSz="914400" rtl="0" eaLnBrk="1" latinLnBrk="0" hangingPunct="1">
         <a:lnSpc>
           <a:spcPct val="90000"/>
         </a:lnSpc>
         <a:spcBef>
-          <a:spcPts val="300"/>
+          <a:spcPts val="500"/>
         </a:spcBef>
         <a:buFont typeface="Arial" panose="020B0604020202020204" pitchFamily="34" charset="0"/>
         <a:buChar char="•"/>
-        <a:defRPr sz="1080" kern="1200">
+        <a:defRPr sz="1800" kern="1200">
           <a:solidFill>
             <a:schemeClr val="tx1"/>
           </a:solidFill>
@@ -6641,16 +6641,16 @@
           <a:cs typeface="+mn-cs"/>
         </a:defRPr>
       </a:lvl4pPr>
-      <a:lvl5pPr marL="1234440" indent="-137160" algn="l" defTabSz="548640" rtl="0" eaLnBrk="1" latinLnBrk="0" hangingPunct="1">
+      <a:lvl5pPr marL="2057400" indent="-228600" algn="l" defTabSz="914400" rtl="0" eaLnBrk="1" latinLnBrk="0" hangingPunct="1">
         <a:lnSpc>
           <a:spcPct val="90000"/>
         </a:lnSpc>
         <a:spcBef>
-          <a:spcPts val="300"/>
+          <a:spcPts val="500"/>
         </a:spcBef>
         <a:buFont typeface="Arial" panose="020B0604020202020204" pitchFamily="34" charset="0"/>
         <a:buChar char="•"/>
-        <a:defRPr sz="1080" kern="1200">
+        <a:defRPr sz="1800" kern="1200">
           <a:solidFill>
             <a:schemeClr val="tx1"/>
           </a:solidFill>
@@ -6659,16 +6659,16 @@
           <a:cs typeface="+mn-cs"/>
         </a:defRPr>
       </a:lvl5pPr>
-      <a:lvl6pPr marL="1508760" indent="-137160" algn="l" defTabSz="548640" rtl="0" eaLnBrk="1" latinLnBrk="0" hangingPunct="1">
+      <a:lvl6pPr marL="2514600" indent="-228600" algn="l" defTabSz="914400" rtl="0" eaLnBrk="1" latinLnBrk="0" hangingPunct="1">
         <a:lnSpc>
           <a:spcPct val="90000"/>
         </a:lnSpc>
         <a:spcBef>
-          <a:spcPts val="300"/>
+          <a:spcPts val="500"/>
         </a:spcBef>
         <a:buFont typeface="Arial" panose="020B0604020202020204" pitchFamily="34" charset="0"/>
         <a:buChar char="•"/>
-        <a:defRPr sz="1080" kern="1200">
+        <a:defRPr sz="1800" kern="1200">
           <a:solidFill>
             <a:schemeClr val="tx1"/>
           </a:solidFill>
@@ -6677,16 +6677,16 @@
           <a:cs typeface="+mn-cs"/>
         </a:defRPr>
       </a:lvl6pPr>
-      <a:lvl7pPr marL="1783080" indent="-137160" algn="l" defTabSz="548640" rtl="0" eaLnBrk="1" latinLnBrk="0" hangingPunct="1">
+      <a:lvl7pPr marL="2971800" indent="-228600" algn="l" defTabSz="914400" rtl="0" eaLnBrk="1" latinLnBrk="0" hangingPunct="1">
         <a:lnSpc>
           <a:spcPct val="90000"/>
         </a:lnSpc>
         <a:spcBef>
-          <a:spcPts val="300"/>
+          <a:spcPts val="500"/>
         </a:spcBef>
         <a:buFont typeface="Arial" panose="020B0604020202020204" pitchFamily="34" charset="0"/>
         <a:buChar char="•"/>
-        <a:defRPr sz="1080" kern="1200">
+        <a:defRPr sz="1800" kern="1200">
           <a:solidFill>
             <a:schemeClr val="tx1"/>
           </a:solidFill>
@@ -6695,16 +6695,16 @@
           <a:cs typeface="+mn-cs"/>
         </a:defRPr>
       </a:lvl7pPr>
-      <a:lvl8pPr marL="2057400" indent="-137160" algn="l" defTabSz="548640" rtl="0" eaLnBrk="1" latinLnBrk="0" hangingPunct="1">
+      <a:lvl8pPr marL="3429000" indent="-228600" algn="l" defTabSz="914400" rtl="0" eaLnBrk="1" latinLnBrk="0" hangingPunct="1">
         <a:lnSpc>
           <a:spcPct val="90000"/>
         </a:lnSpc>
         <a:spcBef>
-          <a:spcPts val="300"/>
+          <a:spcPts val="500"/>
         </a:spcBef>
         <a:buFont typeface="Arial" panose="020B0604020202020204" pitchFamily="34" charset="0"/>
         <a:buChar char="•"/>
-        <a:defRPr sz="1080" kern="1200">
+        <a:defRPr sz="1800" kern="1200">
           <a:solidFill>
             <a:schemeClr val="tx1"/>
           </a:solidFill>
@@ -6713,16 +6713,16 @@
           <a:cs typeface="+mn-cs"/>
         </a:defRPr>
       </a:lvl8pPr>
-      <a:lvl9pPr marL="2331720" indent="-137160" algn="l" defTabSz="548640" rtl="0" eaLnBrk="1" latinLnBrk="0" hangingPunct="1">
+      <a:lvl9pPr marL="3886200" indent="-228600" algn="l" defTabSz="914400" rtl="0" eaLnBrk="1" latinLnBrk="0" hangingPunct="1">
         <a:lnSpc>
           <a:spcPct val="90000"/>
         </a:lnSpc>
         <a:spcBef>
-          <a:spcPts val="300"/>
+          <a:spcPts val="500"/>
         </a:spcBef>
         <a:buFont typeface="Arial" panose="020B0604020202020204" pitchFamily="34" charset="0"/>
         <a:buChar char="•"/>
-        <a:defRPr sz="1080" kern="1200">
+        <a:defRPr sz="1800" kern="1200">
           <a:solidFill>
             <a:schemeClr val="tx1"/>
           </a:solidFill>
@@ -6736,8 +6736,8 @@
       <a:defPPr>
         <a:defRPr lang="en-US"/>
       </a:defPPr>
-      <a:lvl1pPr marL="0" algn="l" defTabSz="548640" rtl="0" eaLnBrk="1" latinLnBrk="0" hangingPunct="1">
-        <a:defRPr sz="1080" kern="1200">
+      <a:lvl1pPr marL="0" algn="l" defTabSz="914400" rtl="0" eaLnBrk="1" latinLnBrk="0" hangingPunct="1">
+        <a:defRPr sz="1800" kern="1200">
           <a:solidFill>
             <a:schemeClr val="tx1"/>
           </a:solidFill>
@@ -6746,8 +6746,8 @@
           <a:cs typeface="+mn-cs"/>
         </a:defRPr>
       </a:lvl1pPr>
-      <a:lvl2pPr marL="274320" algn="l" defTabSz="548640" rtl="0" eaLnBrk="1" latinLnBrk="0" hangingPunct="1">
-        <a:defRPr sz="1080" kern="1200">
+      <a:lvl2pPr marL="457200" algn="l" defTabSz="914400" rtl="0" eaLnBrk="1" latinLnBrk="0" hangingPunct="1">
+        <a:defRPr sz="1800" kern="1200">
           <a:solidFill>
             <a:schemeClr val="tx1"/>
           </a:solidFill>
@@ -6756,8 +6756,8 @@
           <a:cs typeface="+mn-cs"/>
         </a:defRPr>
       </a:lvl2pPr>
-      <a:lvl3pPr marL="548640" algn="l" defTabSz="548640" rtl="0" eaLnBrk="1" latinLnBrk="0" hangingPunct="1">
-        <a:defRPr sz="1080" kern="1200">
+      <a:lvl3pPr marL="914400" algn="l" defTabSz="914400" rtl="0" eaLnBrk="1" latinLnBrk="0" hangingPunct="1">
+        <a:defRPr sz="1800" kern="1200">
           <a:solidFill>
             <a:schemeClr val="tx1"/>
           </a:solidFill>
@@ -6766,8 +6766,8 @@
           <a:cs typeface="+mn-cs"/>
         </a:defRPr>
       </a:lvl3pPr>
-      <a:lvl4pPr marL="822960" algn="l" defTabSz="548640" rtl="0" eaLnBrk="1" latinLnBrk="0" hangingPunct="1">
-        <a:defRPr sz="1080" kern="1200">
+      <a:lvl4pPr marL="1371600" algn="l" defTabSz="914400" rtl="0" eaLnBrk="1" latinLnBrk="0" hangingPunct="1">
+        <a:defRPr sz="1800" kern="1200">
           <a:solidFill>
             <a:schemeClr val="tx1"/>
           </a:solidFill>
@@ -6776,8 +6776,8 @@
           <a:cs typeface="+mn-cs"/>
         </a:defRPr>
       </a:lvl4pPr>
-      <a:lvl5pPr marL="1097280" algn="l" defTabSz="548640" rtl="0" eaLnBrk="1" latinLnBrk="0" hangingPunct="1">
-        <a:defRPr sz="1080" kern="1200">
+      <a:lvl5pPr marL="1828800" algn="l" defTabSz="914400" rtl="0" eaLnBrk="1" latinLnBrk="0" hangingPunct="1">
+        <a:defRPr sz="1800" kern="1200">
           <a:solidFill>
             <a:schemeClr val="tx1"/>
           </a:solidFill>
@@ -6786,8 +6786,8 @@
           <a:cs typeface="+mn-cs"/>
         </a:defRPr>
       </a:lvl5pPr>
-      <a:lvl6pPr marL="1371600" algn="l" defTabSz="548640" rtl="0" eaLnBrk="1" latinLnBrk="0" hangingPunct="1">
-        <a:defRPr sz="1080" kern="1200">
+      <a:lvl6pPr marL="2286000" algn="l" defTabSz="914400" rtl="0" eaLnBrk="1" latinLnBrk="0" hangingPunct="1">
+        <a:defRPr sz="1800" kern="1200">
           <a:solidFill>
             <a:schemeClr val="tx1"/>
           </a:solidFill>
@@ -6796,8 +6796,8 @@
           <a:cs typeface="+mn-cs"/>
         </a:defRPr>
       </a:lvl6pPr>
-      <a:lvl7pPr marL="1645920" algn="l" defTabSz="548640" rtl="0" eaLnBrk="1" latinLnBrk="0" hangingPunct="1">
-        <a:defRPr sz="1080" kern="1200">
+      <a:lvl7pPr marL="2743200" algn="l" defTabSz="914400" rtl="0" eaLnBrk="1" latinLnBrk="0" hangingPunct="1">
+        <a:defRPr sz="1800" kern="1200">
           <a:solidFill>
             <a:schemeClr val="tx1"/>
           </a:solidFill>
@@ -6806,8 +6806,8 @@
           <a:cs typeface="+mn-cs"/>
         </a:defRPr>
       </a:lvl7pPr>
-      <a:lvl8pPr marL="1920240" algn="l" defTabSz="548640" rtl="0" eaLnBrk="1" latinLnBrk="0" hangingPunct="1">
-        <a:defRPr sz="1080" kern="1200">
+      <a:lvl8pPr marL="3200400" algn="l" defTabSz="914400" rtl="0" eaLnBrk="1" latinLnBrk="0" hangingPunct="1">
+        <a:defRPr sz="1800" kern="1200">
           <a:solidFill>
             <a:schemeClr val="tx1"/>
           </a:solidFill>
@@ -6816,8 +6816,8 @@
           <a:cs typeface="+mn-cs"/>
         </a:defRPr>
       </a:lvl8pPr>
-      <a:lvl9pPr marL="2194560" algn="l" defTabSz="548640" rtl="0" eaLnBrk="1" latinLnBrk="0" hangingPunct="1">
-        <a:defRPr sz="1080" kern="1200">
+      <a:lvl9pPr marL="3657600" algn="l" defTabSz="914400" rtl="0" eaLnBrk="1" latinLnBrk="0" hangingPunct="1">
+        <a:defRPr sz="1800" kern="1200">
           <a:solidFill>
             <a:schemeClr val="tx1"/>
           </a:solidFill>
@@ -6866,7 +6866,7 @@
         </p:nvSpPr>
         <p:spPr>
           <a:xfrm>
-            <a:off x="107697" y="185192"/>
+            <a:off x="4414398" y="2329856"/>
             <a:ext cx="2160240" cy="3024336"/>
           </a:xfrm>
           <a:prstGeom prst="roundRect">
@@ -6895,14 +6895,14 @@
           <a:p>
             <a:pPr algn="ctr"/>
             <a:r>
-              <a:rPr lang="en-AU" sz="1600" dirty="0"/>
-              <a:t>Code System:</a:t>
+              <a:rPr lang="en-AU" sz="1600" b="1" dirty="0"/>
+              <a:t>Code System</a:t>
             </a:r>
           </a:p>
           <a:p>
             <a:pPr algn="ctr"/>
             <a:r>
-              <a:rPr lang="en-AU" sz="1600" dirty="0"/>
+              <a:rPr lang="en-AU" sz="1600" i="1" dirty="0"/>
               <a:t>Defines a set of concepts with a coherent meaning</a:t>
             </a:r>
             <a:br>
@@ -6930,6 +6930,17 @@
               <a:t>Definition</a:t>
             </a:r>
           </a:p>
+          <a:p>
+            <a:pPr algn="ctr"/>
+            <a:endParaRPr lang="en-AU" sz="1600" dirty="0"/>
+          </a:p>
+          <a:p>
+            <a:pPr algn="ctr"/>
+            <a:r>
+              <a:rPr lang="en-AU" sz="1600" dirty="0"/>
+              <a:t>e.g. SNOMED CT</a:t>
+            </a:r>
+          </a:p>
         </p:txBody>
       </p:sp>
       <p:sp>
@@ -6940,8 +6951,8 @@
         </p:nvSpPr>
         <p:spPr>
           <a:xfrm>
-            <a:off x="3262537" y="185192"/>
-            <a:ext cx="1980220" cy="1458162"/>
+            <a:off x="7569238" y="2329856"/>
+            <a:ext cx="1980220" cy="1828800"/>
           </a:xfrm>
           <a:prstGeom prst="roundRect">
             <a:avLst/>
@@ -6977,15 +6988,26 @@
           <a:p>
             <a:pPr algn="ctr"/>
             <a:r>
+              <a:rPr lang="en-AU" sz="1600" b="1" dirty="0"/>
+              <a:t>Value Set</a:t>
+            </a:r>
+          </a:p>
+          <a:p>
+            <a:pPr algn="ctr"/>
+            <a:r>
+              <a:rPr lang="en-AU" sz="1600" i="1" dirty="0"/>
+              <a:t>A selection of a set of codes for use in a particular context</a:t>
+            </a:r>
+          </a:p>
+          <a:p>
+            <a:pPr algn="ctr"/>
+            <a:endParaRPr lang="en-AU" sz="1600" i="1" dirty="0"/>
+          </a:p>
+          <a:p>
+            <a:pPr algn="ctr"/>
+            <a:r>
               <a:rPr lang="en-AU" sz="1600" dirty="0"/>
-              <a:t>Value Set:</a:t>
-            </a:r>
-          </a:p>
-          <a:p>
-            <a:pPr algn="ctr"/>
-            <a:r>
-              <a:rPr lang="en-AU" sz="1600" dirty="0"/>
-              <a:t>A selection of a set of codes for use in a particular context</a:t>
+              <a:t>e.g. “SNOMED CT fracture codes”</a:t>
             </a:r>
           </a:p>
         </p:txBody>
@@ -7001,8 +7023,8 @@
         </p:nvCxnSpPr>
         <p:spPr>
           <a:xfrm flipH="1">
-            <a:off x="2267937" y="914273"/>
-            <a:ext cx="994600" cy="335796"/>
+            <a:off x="6574638" y="3244257"/>
+            <a:ext cx="994600" cy="150477"/>
           </a:xfrm>
           <a:prstGeom prst="straightConnector1">
             <a:avLst/>
@@ -7033,9 +7055,9 @@
           <p:nvPr/>
         </p:nvSpPr>
         <p:spPr>
-          <a:xfrm rot="20673188">
-            <a:off x="2347853" y="749406"/>
-            <a:ext cx="731290" cy="323165"/>
+          <a:xfrm rot="21094267">
+            <a:off x="6662660" y="2945300"/>
+            <a:ext cx="766557" cy="338554"/>
           </a:xfrm>
           <a:prstGeom prst="rect">
             <a:avLst/>
@@ -7049,7 +7071,7 @@
           <a:lstStyle/>
           <a:p>
             <a:r>
-              <a:rPr lang="en-AU" sz="1500" dirty="0"/>
+              <a:rPr lang="en-AU" sz="1600" dirty="0"/>
               <a:t>Selects</a:t>
             </a:r>
           </a:p>
@@ -7063,8 +7085,8 @@
         </p:nvSpPr>
         <p:spPr>
           <a:xfrm>
-            <a:off x="5479000" y="587251"/>
-            <a:ext cx="611065" cy="323165"/>
+            <a:off x="9785701" y="2731915"/>
+            <a:ext cx="638316" cy="338554"/>
           </a:xfrm>
           <a:prstGeom prst="rect">
             <a:avLst/>
@@ -7078,7 +7100,7 @@
           <a:lstStyle/>
           <a:p>
             <a:r>
-              <a:rPr lang="en-AU" sz="1500" dirty="0"/>
+              <a:rPr lang="en-AU" sz="1600" dirty="0"/>
               <a:t>Binds</a:t>
             </a:r>
           </a:p>
@@ -7092,8 +7114,8 @@
         </p:nvSpPr>
         <p:spPr>
           <a:xfrm>
-            <a:off x="4108631" y="2422374"/>
-            <a:ext cx="2268252" cy="1574308"/>
+            <a:off x="7563031" y="4434885"/>
+            <a:ext cx="3163485" cy="2194560"/>
           </a:xfrm>
           <a:prstGeom prst="roundRect">
             <a:avLst/>
@@ -7121,47 +7143,61 @@
           </a:fontRef>
         </p:style>
         <p:txBody>
-          <a:bodyPr rtlCol="0" anchor="ctr"/>
+          <a:bodyPr rtlCol="0" anchor="ctr" anchorCtr="0"/>
           <a:lstStyle/>
           <a:p>
             <a:pPr algn="ctr"/>
             <a:r>
-              <a:rPr lang="en-AU" sz="1600"/>
-              <a:t>Element (instance):</a:t>
+              <a:rPr lang="en-AU" sz="1600" b="1" dirty="0"/>
+              <a:t>Element (instance)</a:t>
             </a:r>
           </a:p>
           <a:p>
             <a:pPr algn="ctr"/>
             <a:r>
-              <a:rPr lang="en-AU" sz="1600"/>
+              <a:rPr lang="en-AU" sz="1600" b="1" dirty="0"/>
               <a:t>Coded Data Type</a:t>
             </a:r>
             <a:r>
-              <a:rPr lang="en-AU" sz="1350"/>
+              <a:rPr lang="en-AU" sz="1350" b="1" dirty="0"/>
               <a:t> </a:t>
             </a:r>
             <a:br>
-              <a:rPr lang="en-AU" sz="1350"/>
+              <a:rPr lang="en-AU" sz="1350" dirty="0"/>
             </a:br>
             <a:r>
-              <a:rPr lang="en-AU" sz="1400"/>
+              <a:rPr lang="en-AU" sz="1600" dirty="0"/>
               <a:t>code/</a:t>
             </a:r>
             <a:br>
-              <a:rPr lang="en-AU" sz="1400"/>
+              <a:rPr lang="en-AU" sz="1600" dirty="0"/>
             </a:br>
             <a:r>
-              <a:rPr lang="en-AU" sz="1400"/>
+              <a:rPr lang="en-AU" sz="1600" dirty="0"/>
               <a:t>Coding/</a:t>
             </a:r>
             <a:br>
-              <a:rPr lang="en-AU" sz="1400"/>
+              <a:rPr lang="en-AU" sz="1600" dirty="0"/>
             </a:br>
             <a:r>
-              <a:rPr lang="en-AU" sz="1400" err="1"/>
+              <a:rPr lang="en-AU" sz="1600" dirty="0" err="1"/>
               <a:t>CodeableConcept</a:t>
             </a:r>
-            <a:endParaRPr lang="en-AU" sz="1400"/>
+            <a:br>
+              <a:rPr lang="en-AU" sz="1600" dirty="0"/>
+            </a:br>
+            <a:br>
+              <a:rPr lang="en-AU" sz="1600" dirty="0"/>
+            </a:br>
+            <a:r>
+              <a:rPr lang="en-AU" sz="1600" dirty="0"/>
+              <a:t>e.g. </a:t>
+            </a:r>
+            <a:r>
+              <a:rPr lang="en-US" sz="1600" dirty="0"/>
+              <a:t>263204007 |Fracture of shaft of ulna|</a:t>
+            </a:r>
+            <a:endParaRPr lang="en-AU" sz="1600" dirty="0"/>
           </a:p>
         </p:txBody>
       </p:sp>
@@ -7170,14 +7206,13 @@
           <p:cNvPr id="13" name="Straight Arrow Connector 12"/>
           <p:cNvCxnSpPr>
             <a:cxnSpLocks/>
-            <a:stCxn id="12" idx="1"/>
           </p:cNvCxnSpPr>
           <p:nvPr/>
         </p:nvCxnSpPr>
         <p:spPr>
           <a:xfrm flipH="1" flipV="1">
-            <a:off x="2267937" y="2758173"/>
-            <a:ext cx="1840694" cy="451359"/>
+            <a:off x="6574638" y="4722750"/>
+            <a:ext cx="955210" cy="631442"/>
           </a:xfrm>
           <a:prstGeom prst="straightConnector1">
             <a:avLst/>
@@ -7208,9 +7243,9 @@
           <p:nvPr/>
         </p:nvSpPr>
         <p:spPr>
-          <a:xfrm rot="700199">
-            <a:off x="2867094" y="2596590"/>
-            <a:ext cx="855940" cy="323165"/>
+          <a:xfrm rot="1889056">
+            <a:off x="6708075" y="4729846"/>
+            <a:ext cx="925253" cy="338554"/>
           </a:xfrm>
           <a:prstGeom prst="rect">
             <a:avLst/>
@@ -7224,12 +7259,8 @@
           <a:lstStyle/>
           <a:p>
             <a:r>
-              <a:rPr lang="en-AU" sz="1500" dirty="0"/>
-              <a:t>Refers</a:t>
-            </a:r>
-            <a:r>
-              <a:rPr lang="en-AU" sz="1350" dirty="0"/>
-              <a:t> to</a:t>
+              <a:rPr lang="en-AU" sz="1600" dirty="0"/>
+              <a:t>Refers to</a:t>
             </a:r>
           </a:p>
         </p:txBody>
@@ -7239,14 +7270,15 @@
           <p:cNvPr id="15" name="Straight Arrow Connector 14"/>
           <p:cNvCxnSpPr>
             <a:cxnSpLocks/>
+            <a:stCxn id="12" idx="3"/>
             <a:endCxn id="17" idx="2"/>
           </p:cNvCxnSpPr>
           <p:nvPr/>
         </p:nvCxnSpPr>
         <p:spPr>
           <a:xfrm flipV="1">
-            <a:off x="6376883" y="1600396"/>
-            <a:ext cx="1091366" cy="1609132"/>
+            <a:off x="10726516" y="3966150"/>
+            <a:ext cx="1164636" cy="1566015"/>
           </a:xfrm>
           <a:prstGeom prst="straightConnector1">
             <a:avLst/>
@@ -7277,9 +7309,9 @@
           <p:nvPr/>
         </p:nvSpPr>
         <p:spPr>
-          <a:xfrm rot="18253060">
-            <a:off x="6263349" y="2027526"/>
-            <a:ext cx="1126783" cy="323165"/>
+          <a:xfrm rot="18410870">
+            <a:off x="10554575" y="4455473"/>
+            <a:ext cx="1214307" cy="338554"/>
           </a:xfrm>
           <a:prstGeom prst="rect">
             <a:avLst/>
@@ -7293,12 +7325,8 @@
           <a:lstStyle/>
           <a:p>
             <a:r>
-              <a:rPr lang="en-AU" sz="1500" dirty="0"/>
-              <a:t>Conforms</a:t>
-            </a:r>
-            <a:r>
-              <a:rPr lang="en-AU" sz="1350" dirty="0"/>
-              <a:t> to</a:t>
+              <a:rPr lang="en-AU" sz="1600" dirty="0"/>
+              <a:t>Conforms to</a:t>
             </a:r>
           </a:p>
         </p:txBody>
@@ -7317,8 +7345,8 @@
         </p:nvSpPr>
         <p:spPr>
           <a:xfrm>
-            <a:off x="6237357" y="221574"/>
-            <a:ext cx="2461784" cy="1378822"/>
+            <a:off x="10660260" y="1954470"/>
+            <a:ext cx="2461784" cy="2011680"/>
           </a:xfrm>
           <a:prstGeom prst="roundRect">
             <a:avLst/>
@@ -7355,16 +7383,31 @@
           <a:p>
             <a:pPr algn="ctr"/>
             <a:r>
-              <a:rPr lang="en-AU" sz="1600" dirty="0"/>
-              <a:t>Element Definition: </a:t>
+              <a:rPr lang="en-AU" sz="1600" b="1" dirty="0"/>
+              <a:t>Element Definition </a:t>
             </a:r>
             <a:br>
               <a:rPr lang="en-AU" sz="1600" dirty="0"/>
             </a:br>
             <a:r>
+              <a:rPr lang="en-AU" sz="1600" i="1" dirty="0"/>
+              <a:t>Data element, binding characteristics and value set reference</a:t>
+            </a:r>
+            <a:br>
+              <a:rPr lang="en-AU" sz="1600" i="1" dirty="0"/>
+            </a:br>
+            <a:br>
+              <a:rPr lang="en-AU" sz="1600" i="1" dirty="0"/>
+            </a:br>
+            <a:r>
               <a:rPr lang="en-AU" sz="1600" dirty="0"/>
-              <a:t>Data element and binding characteristics and value set reference</a:t>
-            </a:r>
+              <a:t>e.g. </a:t>
+            </a:r>
+            <a:r>
+              <a:rPr lang="en-AU" sz="1600" dirty="0" err="1"/>
+              <a:t>Condition.code</a:t>
+            </a:r>
+            <a:endParaRPr lang="en-AU" sz="1600" i="1" dirty="0"/>
           </a:p>
         </p:txBody>
       </p:sp>
@@ -7384,8 +7427,8 @@
         </p:nvCxnSpPr>
         <p:spPr>
           <a:xfrm flipH="1">
-            <a:off x="5242757" y="910985"/>
-            <a:ext cx="994600" cy="3288"/>
+            <a:off x="9549459" y="3058937"/>
+            <a:ext cx="1102163" cy="0"/>
           </a:xfrm>
           <a:prstGeom prst="straightConnector1">
             <a:avLst/>
@@ -7409,6 +7452,423 @@
           </a:fontRef>
         </p:style>
       </p:cxnSp>
+      <p:sp>
+        <p:nvSpPr>
+          <p:cNvPr id="20" name="Rounded Rectangle 19">
+            <a:extLst>
+              <a:ext uri="{FF2B5EF4-FFF2-40B4-BE49-F238E27FC236}">
+                <a16:creationId xmlns:a16="http://schemas.microsoft.com/office/drawing/2014/main" id="{9C3CC9E6-7E1B-9D4B-A928-7A167A846CEC}"/>
+              </a:ext>
+            </a:extLst>
+          </p:cNvPr>
+          <p:cNvSpPr/>
+          <p:nvPr/>
+        </p:nvSpPr>
+        <p:spPr>
+          <a:xfrm>
+            <a:off x="5761406" y="37070"/>
+            <a:ext cx="5394153" cy="1645920"/>
+          </a:xfrm>
+          <a:prstGeom prst="roundRect">
+            <a:avLst/>
+          </a:prstGeom>
+          <a:solidFill>
+            <a:srgbClr val="7030A0"/>
+          </a:solidFill>
+          <a:ln w="12700">
+            <a:prstDash val="solid"/>
+          </a:ln>
+        </p:spPr>
+        <p:style>
+          <a:lnRef idx="2">
+            <a:schemeClr val="accent1">
+              <a:shade val="50000"/>
+            </a:schemeClr>
+          </a:lnRef>
+          <a:fillRef idx="1">
+            <a:schemeClr val="accent1"/>
+          </a:fillRef>
+          <a:effectRef idx="0">
+            <a:schemeClr val="accent1"/>
+          </a:effectRef>
+          <a:fontRef idx="minor">
+            <a:schemeClr val="lt1"/>
+          </a:fontRef>
+        </p:style>
+        <p:txBody>
+          <a:bodyPr rtlCol="0" anchor="ctr"/>
+          <a:lstStyle/>
+          <a:p>
+            <a:pPr algn="ctr"/>
+            <a:r>
+              <a:rPr lang="en-AU" sz="1600" b="1" dirty="0" err="1"/>
+              <a:t>ConceptMap</a:t>
+            </a:r>
+            <a:endParaRPr lang="en-AU" sz="1600" b="1" dirty="0"/>
+          </a:p>
+          <a:p>
+            <a:pPr algn="ctr"/>
+            <a:r>
+              <a:rPr lang="en-US" sz="1600" i="1" dirty="0"/>
+              <a:t>Mappings between code system concepts (in source and target </a:t>
+            </a:r>
+            <a:r>
+              <a:rPr lang="en-US" sz="1600" i="1"/>
+              <a:t>value set contexts)</a:t>
+            </a:r>
+            <a:br>
+              <a:rPr lang="en-US" sz="1600" i="1" dirty="0"/>
+            </a:br>
+            <a:r>
+              <a:rPr lang="en-AU" sz="1600" dirty="0"/>
+              <a:t>e.g. </a:t>
+            </a:r>
+            <a:r>
+              <a:rPr lang="en-US" sz="1600" dirty="0"/>
+              <a:t>263204007 |Fracture of shaft of ulna| (SNOMED CT)</a:t>
+            </a:r>
+            <a:br>
+              <a:rPr lang="en-AU" sz="1600" dirty="0"/>
+            </a:br>
+            <a:r>
+              <a:rPr lang="en-AU" sz="1600" dirty="0">
+                <a:sym typeface="Wingdings" pitchFamily="2" charset="2"/>
+              </a:rPr>
+              <a:t> </a:t>
+            </a:r>
+            <a:r>
+              <a:rPr lang="en-AU" sz="1600" dirty="0"/>
+              <a:t>S52.209A “</a:t>
+            </a:r>
+            <a:r>
+              <a:rPr lang="en-US" sz="1600" dirty="0"/>
+              <a:t>Unspecified fracture of shaft of unspecified ulna, initial encounter for closed fracture</a:t>
+            </a:r>
+            <a:r>
+              <a:rPr lang="en-AU" sz="1600" dirty="0"/>
+              <a:t>” (ICD-10-CM) </a:t>
+            </a:r>
+          </a:p>
+        </p:txBody>
+      </p:sp>
+      <p:cxnSp>
+        <p:nvCxnSpPr>
+          <p:cNvPr id="21" name="Straight Arrow Connector 20">
+            <a:extLst>
+              <a:ext uri="{FF2B5EF4-FFF2-40B4-BE49-F238E27FC236}">
+                <a16:creationId xmlns:a16="http://schemas.microsoft.com/office/drawing/2014/main" id="{3274FA09-C206-4E4D-97B4-1AF2E131F2EE}"/>
+              </a:ext>
+            </a:extLst>
+          </p:cNvPr>
+          <p:cNvCxnSpPr>
+            <a:cxnSpLocks/>
+          </p:cNvCxnSpPr>
+          <p:nvPr/>
+        </p:nvCxnSpPr>
+        <p:spPr>
+          <a:xfrm>
+            <a:off x="3259311" y="3943177"/>
+            <a:ext cx="1153239" cy="1"/>
+          </a:xfrm>
+          <a:prstGeom prst="straightConnector1">
+            <a:avLst/>
+          </a:prstGeom>
+          <a:ln w="38100">
+            <a:tailEnd type="arrow"/>
+          </a:ln>
+        </p:spPr>
+        <p:style>
+          <a:lnRef idx="1">
+            <a:schemeClr val="accent1"/>
+          </a:lnRef>
+          <a:fillRef idx="0">
+            <a:schemeClr val="accent1"/>
+          </a:fillRef>
+          <a:effectRef idx="0">
+            <a:schemeClr val="accent1"/>
+          </a:effectRef>
+          <a:fontRef idx="minor">
+            <a:schemeClr val="tx1"/>
+          </a:fontRef>
+        </p:style>
+      </p:cxnSp>
+      <p:sp>
+        <p:nvSpPr>
+          <p:cNvPr id="22" name="TextBox 21">
+            <a:extLst>
+              <a:ext uri="{FF2B5EF4-FFF2-40B4-BE49-F238E27FC236}">
+                <a16:creationId xmlns:a16="http://schemas.microsoft.com/office/drawing/2014/main" id="{AB2F5320-251D-DE4C-8256-93F311742EA6}"/>
+              </a:ext>
+            </a:extLst>
+          </p:cNvPr>
+          <p:cNvSpPr txBox="1"/>
+          <p:nvPr/>
+        </p:nvSpPr>
+        <p:spPr>
+          <a:xfrm>
+            <a:off x="3265510" y="3604622"/>
+            <a:ext cx="958596" cy="338554"/>
+          </a:xfrm>
+          <a:prstGeom prst="rect">
+            <a:avLst/>
+          </a:prstGeom>
+          <a:noFill/>
+        </p:spPr>
+        <p:txBody>
+          <a:bodyPr wrap="none" rtlCol="0">
+            <a:spAutoFit/>
+          </a:bodyPr>
+          <a:lstStyle/>
+          <a:p>
+            <a:r>
+              <a:rPr lang="en-AU" sz="1600" dirty="0"/>
+              <a:t>Identifies</a:t>
+            </a:r>
+          </a:p>
+        </p:txBody>
+      </p:sp>
+      <p:sp>
+        <p:nvSpPr>
+          <p:cNvPr id="27" name="Rounded Rectangle 26">
+            <a:extLst>
+              <a:ext uri="{FF2B5EF4-FFF2-40B4-BE49-F238E27FC236}">
+                <a16:creationId xmlns:a16="http://schemas.microsoft.com/office/drawing/2014/main" id="{A4DC6FB9-3728-B549-9E8A-63A7BECA61C2}"/>
+              </a:ext>
+            </a:extLst>
+          </p:cNvPr>
+          <p:cNvSpPr/>
+          <p:nvPr/>
+        </p:nvSpPr>
+        <p:spPr>
+          <a:xfrm>
+            <a:off x="809328" y="2996952"/>
+            <a:ext cx="2438181" cy="2011680"/>
+          </a:xfrm>
+          <a:prstGeom prst="roundRect">
+            <a:avLst/>
+          </a:prstGeom>
+          <a:solidFill>
+            <a:srgbClr val="00B0F0"/>
+          </a:solidFill>
+          <a:ln w="12700">
+            <a:prstDash val="solid"/>
+          </a:ln>
+        </p:spPr>
+        <p:style>
+          <a:lnRef idx="2">
+            <a:schemeClr val="accent1">
+              <a:shade val="50000"/>
+            </a:schemeClr>
+          </a:lnRef>
+          <a:fillRef idx="1">
+            <a:schemeClr val="accent1"/>
+          </a:fillRef>
+          <a:effectRef idx="0">
+            <a:schemeClr val="accent1"/>
+          </a:effectRef>
+          <a:fontRef idx="minor">
+            <a:schemeClr val="lt1"/>
+          </a:fontRef>
+        </p:style>
+        <p:txBody>
+          <a:bodyPr rtlCol="0" anchor="ctr"/>
+          <a:lstStyle/>
+          <a:p>
+            <a:pPr algn="ctr"/>
+            <a:r>
+              <a:rPr lang="en-AU" sz="1600" b="1" dirty="0"/>
+              <a:t>Naming System</a:t>
+            </a:r>
+          </a:p>
+          <a:p>
+            <a:pPr algn="ctr"/>
+            <a:r>
+              <a:rPr lang="en-US" sz="1600" i="1" dirty="0"/>
+              <a:t>Defines the identifiers of a code or identifier system</a:t>
+            </a:r>
+            <a:endParaRPr lang="en-AU" sz="1600" i="1" dirty="0"/>
+          </a:p>
+          <a:p>
+            <a:pPr algn="ctr"/>
+            <a:r>
+              <a:rPr lang="en-AU" sz="1600" dirty="0"/>
+              <a:t>e.g. 2.16.840.1.113883.6.96</a:t>
+            </a:r>
+            <a:br>
+              <a:rPr lang="en-AU" sz="1600" dirty="0"/>
+            </a:br>
+            <a:r>
+              <a:rPr lang="en-AU" sz="1600" dirty="0"/>
+              <a:t>http://</a:t>
+            </a:r>
+            <a:r>
+              <a:rPr lang="en-AU" sz="1600" dirty="0" err="1"/>
+              <a:t>snomed.info</a:t>
+            </a:r>
+            <a:r>
+              <a:rPr lang="en-AU" sz="1600" dirty="0"/>
+              <a:t>/</a:t>
+            </a:r>
+            <a:r>
+              <a:rPr lang="en-AU" sz="1600" dirty="0" err="1"/>
+              <a:t>sct</a:t>
+            </a:r>
+            <a:endParaRPr lang="en-AU" sz="1600" dirty="0"/>
+          </a:p>
+        </p:txBody>
+      </p:sp>
+      <p:cxnSp>
+        <p:nvCxnSpPr>
+          <p:cNvPr id="28" name="Straight Arrow Connector 27">
+            <a:extLst>
+              <a:ext uri="{FF2B5EF4-FFF2-40B4-BE49-F238E27FC236}">
+                <a16:creationId xmlns:a16="http://schemas.microsoft.com/office/drawing/2014/main" id="{C72363A6-EA93-7545-80E3-EB836FD20794}"/>
+              </a:ext>
+            </a:extLst>
+          </p:cNvPr>
+          <p:cNvCxnSpPr>
+            <a:cxnSpLocks/>
+          </p:cNvCxnSpPr>
+          <p:nvPr/>
+        </p:nvCxnSpPr>
+        <p:spPr>
+          <a:xfrm>
+            <a:off x="8793468" y="1685192"/>
+            <a:ext cx="0" cy="640080"/>
+          </a:xfrm>
+          <a:prstGeom prst="straightConnector1">
+            <a:avLst/>
+          </a:prstGeom>
+          <a:ln w="38100">
+            <a:tailEnd type="arrow"/>
+          </a:ln>
+        </p:spPr>
+        <p:style>
+          <a:lnRef idx="1">
+            <a:schemeClr val="accent1"/>
+          </a:lnRef>
+          <a:fillRef idx="0">
+            <a:schemeClr val="accent1"/>
+          </a:fillRef>
+          <a:effectRef idx="0">
+            <a:schemeClr val="accent1"/>
+          </a:effectRef>
+          <a:fontRef idx="minor">
+            <a:schemeClr val="tx1"/>
+          </a:fontRef>
+        </p:style>
+      </p:cxnSp>
+      <p:cxnSp>
+        <p:nvCxnSpPr>
+          <p:cNvPr id="31" name="Straight Arrow Connector 30">
+            <a:extLst>
+              <a:ext uri="{FF2B5EF4-FFF2-40B4-BE49-F238E27FC236}">
+                <a16:creationId xmlns:a16="http://schemas.microsoft.com/office/drawing/2014/main" id="{E81E4BBA-BF77-FC42-B977-C6B415FB680E}"/>
+              </a:ext>
+            </a:extLst>
+          </p:cNvPr>
+          <p:cNvCxnSpPr>
+            <a:cxnSpLocks/>
+          </p:cNvCxnSpPr>
+          <p:nvPr/>
+        </p:nvCxnSpPr>
+        <p:spPr>
+          <a:xfrm flipV="1">
+            <a:off x="8266997" y="1685192"/>
+            <a:ext cx="1" cy="640080"/>
+          </a:xfrm>
+          <a:prstGeom prst="straightConnector1">
+            <a:avLst/>
+          </a:prstGeom>
+          <a:ln w="38100">
+            <a:tailEnd type="arrow"/>
+          </a:ln>
+        </p:spPr>
+        <p:style>
+          <a:lnRef idx="1">
+            <a:schemeClr val="accent1"/>
+          </a:lnRef>
+          <a:fillRef idx="0">
+            <a:schemeClr val="accent1"/>
+          </a:fillRef>
+          <a:effectRef idx="0">
+            <a:schemeClr val="accent1"/>
+          </a:effectRef>
+          <a:fontRef idx="minor">
+            <a:schemeClr val="tx1"/>
+          </a:fontRef>
+        </p:style>
+      </p:cxnSp>
+      <p:sp>
+        <p:nvSpPr>
+          <p:cNvPr id="34" name="TextBox 33">
+            <a:extLst>
+              <a:ext uri="{FF2B5EF4-FFF2-40B4-BE49-F238E27FC236}">
+                <a16:creationId xmlns:a16="http://schemas.microsoft.com/office/drawing/2014/main" id="{7B5785C1-C6A4-DE4F-845A-BA16599D0DC3}"/>
+              </a:ext>
+            </a:extLst>
+          </p:cNvPr>
+          <p:cNvSpPr txBox="1"/>
+          <p:nvPr/>
+        </p:nvSpPr>
+        <p:spPr>
+          <a:xfrm>
+            <a:off x="8793468" y="1868072"/>
+            <a:ext cx="700000" cy="338554"/>
+          </a:xfrm>
+          <a:prstGeom prst="rect">
+            <a:avLst/>
+          </a:prstGeom>
+          <a:noFill/>
+        </p:spPr>
+        <p:txBody>
+          <a:bodyPr wrap="none" rtlCol="0">
+            <a:spAutoFit/>
+          </a:bodyPr>
+          <a:lstStyle/>
+          <a:p>
+            <a:r>
+              <a:rPr lang="en-AU" sz="1600" dirty="0"/>
+              <a:t>Target</a:t>
+            </a:r>
+          </a:p>
+        </p:txBody>
+      </p:sp>
+      <p:sp>
+        <p:nvSpPr>
+          <p:cNvPr id="35" name="TextBox 34">
+            <a:extLst>
+              <a:ext uri="{FF2B5EF4-FFF2-40B4-BE49-F238E27FC236}">
+                <a16:creationId xmlns:a16="http://schemas.microsoft.com/office/drawing/2014/main" id="{7A6F9475-B14F-5745-A51A-5A0489E4B003}"/>
+              </a:ext>
+            </a:extLst>
+          </p:cNvPr>
+          <p:cNvSpPr txBox="1"/>
+          <p:nvPr/>
+        </p:nvSpPr>
+        <p:spPr>
+          <a:xfrm>
+            <a:off x="7496766" y="1868072"/>
+            <a:ext cx="753924" cy="338554"/>
+          </a:xfrm>
+          <a:prstGeom prst="rect">
+            <a:avLst/>
+          </a:prstGeom>
+          <a:noFill/>
+        </p:spPr>
+        <p:txBody>
+          <a:bodyPr wrap="none" rtlCol="0">
+            <a:spAutoFit/>
+          </a:bodyPr>
+          <a:lstStyle/>
+          <a:p>
+            <a:r>
+              <a:rPr lang="en-AU" sz="1600" dirty="0"/>
+              <a:t>Source</a:t>
+            </a:r>
+          </a:p>
+        </p:txBody>
+      </p:sp>
     </p:spTree>
     <p:extLst>
       <p:ext uri="{BB962C8B-B14F-4D97-AF65-F5344CB8AC3E}">

</xml_diff>